<commit_message>
Update High School/Modern Electricity and Electronics/Unit 3 - Ohm's Law/Section 1 - Ohms Law/Assets/Unit 3 - Section 1 - Ohms Law.pptx
</commit_message>
<xml_diff>
--- a/High School/Modern Electricity and Electronics/Unit 3 - Ohm's Law/Section 1 - Ohms Law/Assets/Unit 3 - Section 1 - Ohms Law.pptx
+++ b/High School/Modern Electricity and Electronics/Unit 3 - Ohm's Law/Section 1 - Ohms Law/Assets/Unit 3 - Section 1 - Ohms Law.pptx
@@ -5,20 +5,36 @@
     <p:sldMasterId id="2147483705" r:id="rId1"/>
   </p:sldMasterIdLst>
   <p:notesMasterIdLst>
-    <p:notesMasterId r:id="rId10"/>
+    <p:notesMasterId r:id="rId26"/>
   </p:notesMasterIdLst>
   <p:handoutMasterIdLst>
-    <p:handoutMasterId r:id="rId11"/>
+    <p:handoutMasterId r:id="rId27"/>
   </p:handoutMasterIdLst>
   <p:sldIdLst>
     <p:sldId id="268" r:id="rId2"/>
     <p:sldId id="277" r:id="rId3"/>
     <p:sldId id="272" r:id="rId4"/>
-    <p:sldId id="271" r:id="rId5"/>
-    <p:sldId id="273" r:id="rId6"/>
-    <p:sldId id="274" r:id="rId7"/>
-    <p:sldId id="278" r:id="rId8"/>
-    <p:sldId id="279" r:id="rId9"/>
+    <p:sldId id="280" r:id="rId5"/>
+    <p:sldId id="281" r:id="rId6"/>
+    <p:sldId id="282" r:id="rId7"/>
+    <p:sldId id="283" r:id="rId8"/>
+    <p:sldId id="284" r:id="rId9"/>
+    <p:sldId id="285" r:id="rId10"/>
+    <p:sldId id="286" r:id="rId11"/>
+    <p:sldId id="287" r:id="rId12"/>
+    <p:sldId id="288" r:id="rId13"/>
+    <p:sldId id="289" r:id="rId14"/>
+    <p:sldId id="290" r:id="rId15"/>
+    <p:sldId id="291" r:id="rId16"/>
+    <p:sldId id="292" r:id="rId17"/>
+    <p:sldId id="293" r:id="rId18"/>
+    <p:sldId id="294" r:id="rId19"/>
+    <p:sldId id="295" r:id="rId20"/>
+    <p:sldId id="271" r:id="rId21"/>
+    <p:sldId id="273" r:id="rId22"/>
+    <p:sldId id="274" r:id="rId23"/>
+    <p:sldId id="278" r:id="rId24"/>
+    <p:sldId id="279" r:id="rId25"/>
   </p:sldIdLst>
   <p:sldSz cx="12192000" cy="6858000"/>
   <p:notesSz cx="6858000" cy="9144000"/>
@@ -4816,6 +4832,1376 @@
 </p:sld>
 </file>
 
+<file path=ppt/slides/slide10.xml><?xml version="1.0" encoding="utf-8"?>
+<p:sld xmlns:a="http://schemas.openxmlformats.org/drawingml/2006/main" xmlns:r="http://schemas.openxmlformats.org/officeDocument/2006/relationships" xmlns:p="http://schemas.openxmlformats.org/presentationml/2006/main">
+  <p:cSld>
+    <p:bg>
+      <p:bgPr>
+        <a:solidFill>
+          <a:schemeClr val="bg1"/>
+        </a:solidFill>
+        <a:effectLst/>
+      </p:bgPr>
+    </p:bg>
+    <p:spTree>
+      <p:nvGrpSpPr>
+        <p:cNvPr id="1" name=""/>
+        <p:cNvGrpSpPr/>
+        <p:nvPr/>
+      </p:nvGrpSpPr>
+      <p:grpSpPr>
+        <a:xfrm>
+          <a:off x="0" y="0"/>
+          <a:ext cx="0" cy="0"/>
+          <a:chOff x="0" y="0"/>
+          <a:chExt cx="0" cy="0"/>
+        </a:xfrm>
+      </p:grpSpPr>
+      <p:pic>
+        <p:nvPicPr>
+          <p:cNvPr id="6146" name="Picture 2" descr="Forms response chart. Question title: An example of a control device is. Number of responses: 18 / 18 correct responses.">
+            <a:extLst>
+              <a:ext uri="{FF2B5EF4-FFF2-40B4-BE49-F238E27FC236}">
+                <a16:creationId xmlns:a16="http://schemas.microsoft.com/office/drawing/2014/main" id="{8B7F6D3B-CD71-47F8-B76F-D8041449C97D}"/>
+              </a:ext>
+            </a:extLst>
+          </p:cNvPr>
+          <p:cNvPicPr>
+            <a:picLocks noChangeAspect="1" noChangeArrowheads="1"/>
+          </p:cNvPicPr>
+          <p:nvPr/>
+        </p:nvPicPr>
+        <p:blipFill>
+          <a:blip r:embed="rId2">
+            <a:extLst>
+              <a:ext uri="{28A0092B-C50C-407E-A947-70E740481C1C}">
+                <a14:useLocalDpi xmlns:a14="http://schemas.microsoft.com/office/drawing/2010/main" val="0"/>
+              </a:ext>
+            </a:extLst>
+          </a:blip>
+          <a:srcRect/>
+          <a:stretch>
+            <a:fillRect/>
+          </a:stretch>
+        </p:blipFill>
+        <p:spPr bwMode="auto">
+          <a:xfrm>
+            <a:off x="1216555" y="643467"/>
+            <a:ext cx="9758890" cy="5050225"/>
+          </a:xfrm>
+          <a:prstGeom prst="rect">
+            <a:avLst/>
+          </a:prstGeom>
+          <a:noFill/>
+          <a:extLst>
+            <a:ext uri="{909E8E84-426E-40DD-AFC4-6F175D3DCCD1}">
+              <a14:hiddenFill xmlns:a14="http://schemas.microsoft.com/office/drawing/2010/main">
+                <a:solidFill>
+                  <a:srgbClr val="FFFFFF"/>
+                </a:solidFill>
+              </a14:hiddenFill>
+            </a:ext>
+          </a:extLst>
+        </p:spPr>
+      </p:pic>
+      <p:sp>
+        <p:nvSpPr>
+          <p:cNvPr id="2" name="Footer Placeholder 1">
+            <a:extLst>
+              <a:ext uri="{FF2B5EF4-FFF2-40B4-BE49-F238E27FC236}">
+                <a16:creationId xmlns:a16="http://schemas.microsoft.com/office/drawing/2014/main" id="{480C54D0-B1F3-4F70-AE07-00829A51B5BA}"/>
+              </a:ext>
+            </a:extLst>
+          </p:cNvPr>
+          <p:cNvSpPr>
+            <a:spLocks noGrp="1"/>
+          </p:cNvSpPr>
+          <p:nvPr>
+            <p:ph type="ftr" sz="quarter" idx="11"/>
+          </p:nvPr>
+        </p:nvSpPr>
+        <p:spPr>
+          <a:xfrm>
+            <a:off x="3686185" y="6459785"/>
+            <a:ext cx="4822804" cy="365125"/>
+          </a:xfrm>
+        </p:spPr>
+        <p:txBody>
+          <a:bodyPr>
+            <a:normAutofit/>
+          </a:bodyPr>
+          <a:lstStyle/>
+          <a:p>
+            <a:pPr>
+              <a:spcAft>
+                <a:spcPts val="600"/>
+              </a:spcAft>
+            </a:pPr>
+            <a:r>
+              <a:rPr lang="en-US"/>
+              <a:t>Add a footer</a:t>
+            </a:r>
+          </a:p>
+        </p:txBody>
+      </p:sp>
+    </p:spTree>
+    <p:extLst>
+      <p:ext uri="{BB962C8B-B14F-4D97-AF65-F5344CB8AC3E}">
+        <p14:creationId xmlns:p14="http://schemas.microsoft.com/office/powerpoint/2010/main" val="2510529592"/>
+      </p:ext>
+    </p:extLst>
+  </p:cSld>
+  <p:clrMapOvr>
+    <a:masterClrMapping/>
+  </p:clrMapOvr>
+  <mc:AlternateContent xmlns:mc="http://schemas.openxmlformats.org/markup-compatibility/2006" xmlns:p14="http://schemas.microsoft.com/office/powerpoint/2010/main">
+    <mc:Choice Requires="p14">
+      <p:transition spd="med" p14:dur="700">
+        <p:fade/>
+      </p:transition>
+    </mc:Choice>
+    <mc:Fallback xmlns="">
+      <p:transition spd="med">
+        <p:fade/>
+      </p:transition>
+    </mc:Fallback>
+  </mc:AlternateContent>
+</p:sld>
+</file>
+
+<file path=ppt/slides/slide11.xml><?xml version="1.0" encoding="utf-8"?>
+<p:sld xmlns:a="http://schemas.openxmlformats.org/drawingml/2006/main" xmlns:r="http://schemas.openxmlformats.org/officeDocument/2006/relationships" xmlns:p="http://schemas.openxmlformats.org/presentationml/2006/main">
+  <p:cSld>
+    <p:bg>
+      <p:bgPr>
+        <a:solidFill>
+          <a:schemeClr val="bg1"/>
+        </a:solidFill>
+        <a:effectLst/>
+      </p:bgPr>
+    </p:bg>
+    <p:spTree>
+      <p:nvGrpSpPr>
+        <p:cNvPr id="1" name=""/>
+        <p:cNvGrpSpPr/>
+        <p:nvPr/>
+      </p:nvGrpSpPr>
+      <p:grpSpPr>
+        <a:xfrm>
+          <a:off x="0" y="0"/>
+          <a:ext cx="0" cy="0"/>
+          <a:chOff x="0" y="0"/>
+          <a:chExt cx="0" cy="0"/>
+        </a:xfrm>
+      </p:grpSpPr>
+      <p:pic>
+        <p:nvPicPr>
+          <p:cNvPr id="7170" name="Picture 2" descr="Forms response chart. Question title: If a circuit is said to be closed electrons are. Number of responses: 17 / 18 correct responses.">
+            <a:extLst>
+              <a:ext uri="{FF2B5EF4-FFF2-40B4-BE49-F238E27FC236}">
+                <a16:creationId xmlns:a16="http://schemas.microsoft.com/office/drawing/2014/main" id="{98E7F43F-FC04-4868-8105-14E83475CF9D}"/>
+              </a:ext>
+            </a:extLst>
+          </p:cNvPr>
+          <p:cNvPicPr>
+            <a:picLocks noChangeAspect="1" noChangeArrowheads="1"/>
+          </p:cNvPicPr>
+          <p:nvPr/>
+        </p:nvPicPr>
+        <p:blipFill>
+          <a:blip r:embed="rId2">
+            <a:extLst>
+              <a:ext uri="{28A0092B-C50C-407E-A947-70E740481C1C}">
+                <a14:useLocalDpi xmlns:a14="http://schemas.microsoft.com/office/drawing/2010/main" val="0"/>
+              </a:ext>
+            </a:extLst>
+          </a:blip>
+          <a:srcRect/>
+          <a:stretch>
+            <a:fillRect/>
+          </a:stretch>
+        </p:blipFill>
+        <p:spPr bwMode="auto">
+          <a:xfrm>
+            <a:off x="1216555" y="643467"/>
+            <a:ext cx="9758890" cy="5050225"/>
+          </a:xfrm>
+          <a:prstGeom prst="rect">
+            <a:avLst/>
+          </a:prstGeom>
+          <a:noFill/>
+          <a:extLst>
+            <a:ext uri="{909E8E84-426E-40DD-AFC4-6F175D3DCCD1}">
+              <a14:hiddenFill xmlns:a14="http://schemas.microsoft.com/office/drawing/2010/main">
+                <a:solidFill>
+                  <a:srgbClr val="FFFFFF"/>
+                </a:solidFill>
+              </a14:hiddenFill>
+            </a:ext>
+          </a:extLst>
+        </p:spPr>
+      </p:pic>
+      <p:sp>
+        <p:nvSpPr>
+          <p:cNvPr id="2" name="Footer Placeholder 1">
+            <a:extLst>
+              <a:ext uri="{FF2B5EF4-FFF2-40B4-BE49-F238E27FC236}">
+                <a16:creationId xmlns:a16="http://schemas.microsoft.com/office/drawing/2014/main" id="{9BE8AEED-7266-4841-80BD-6B32D4B4B58D}"/>
+              </a:ext>
+            </a:extLst>
+          </p:cNvPr>
+          <p:cNvSpPr>
+            <a:spLocks noGrp="1"/>
+          </p:cNvSpPr>
+          <p:nvPr>
+            <p:ph type="ftr" sz="quarter" idx="11"/>
+          </p:nvPr>
+        </p:nvSpPr>
+        <p:spPr>
+          <a:xfrm>
+            <a:off x="3686185" y="6459785"/>
+            <a:ext cx="4822804" cy="365125"/>
+          </a:xfrm>
+        </p:spPr>
+        <p:txBody>
+          <a:bodyPr>
+            <a:normAutofit/>
+          </a:bodyPr>
+          <a:lstStyle/>
+          <a:p>
+            <a:pPr>
+              <a:spcAft>
+                <a:spcPts val="600"/>
+              </a:spcAft>
+            </a:pPr>
+            <a:r>
+              <a:rPr lang="en-US"/>
+              <a:t>Add a footer</a:t>
+            </a:r>
+          </a:p>
+        </p:txBody>
+      </p:sp>
+    </p:spTree>
+    <p:extLst>
+      <p:ext uri="{BB962C8B-B14F-4D97-AF65-F5344CB8AC3E}">
+        <p14:creationId xmlns:p14="http://schemas.microsoft.com/office/powerpoint/2010/main" val="3577504125"/>
+      </p:ext>
+    </p:extLst>
+  </p:cSld>
+  <p:clrMapOvr>
+    <a:masterClrMapping/>
+  </p:clrMapOvr>
+  <mc:AlternateContent xmlns:mc="http://schemas.openxmlformats.org/markup-compatibility/2006" xmlns:p14="http://schemas.microsoft.com/office/powerpoint/2010/main">
+    <mc:Choice Requires="p14">
+      <p:transition spd="med" p14:dur="700">
+        <p:fade/>
+      </p:transition>
+    </mc:Choice>
+    <mc:Fallback xmlns="">
+      <p:transition spd="med">
+        <p:fade/>
+      </p:transition>
+    </mc:Fallback>
+  </mc:AlternateContent>
+</p:sld>
+</file>
+
+<file path=ppt/slides/slide12.xml><?xml version="1.0" encoding="utf-8"?>
+<p:sld xmlns:a="http://schemas.openxmlformats.org/drawingml/2006/main" xmlns:r="http://schemas.openxmlformats.org/officeDocument/2006/relationships" xmlns:p="http://schemas.openxmlformats.org/presentationml/2006/main">
+  <p:cSld>
+    <p:bg>
+      <p:bgPr>
+        <a:solidFill>
+          <a:schemeClr val="bg1"/>
+        </a:solidFill>
+        <a:effectLst/>
+      </p:bgPr>
+    </p:bg>
+    <p:spTree>
+      <p:nvGrpSpPr>
+        <p:cNvPr id="1" name=""/>
+        <p:cNvGrpSpPr/>
+        <p:nvPr/>
+      </p:nvGrpSpPr>
+      <p:grpSpPr>
+        <a:xfrm>
+          <a:off x="0" y="0"/>
+          <a:ext cx="0" cy="0"/>
+          <a:chOff x="0" y="0"/>
+          <a:chExt cx="0" cy="0"/>
+        </a:xfrm>
+      </p:grpSpPr>
+      <p:pic>
+        <p:nvPicPr>
+          <p:cNvPr id="8194" name="Picture 2" descr="Forms response chart. Question title: The symbol for voltage is. Number of responses: 18 / 18 correct responses.">
+            <a:extLst>
+              <a:ext uri="{FF2B5EF4-FFF2-40B4-BE49-F238E27FC236}">
+                <a16:creationId xmlns:a16="http://schemas.microsoft.com/office/drawing/2014/main" id="{1B04F1D9-C102-4681-A3D7-C2E14CFD4B2D}"/>
+              </a:ext>
+            </a:extLst>
+          </p:cNvPr>
+          <p:cNvPicPr>
+            <a:picLocks noChangeAspect="1" noChangeArrowheads="1"/>
+          </p:cNvPicPr>
+          <p:nvPr/>
+        </p:nvPicPr>
+        <p:blipFill>
+          <a:blip r:embed="rId2">
+            <a:extLst>
+              <a:ext uri="{28A0092B-C50C-407E-A947-70E740481C1C}">
+                <a14:useLocalDpi xmlns:a14="http://schemas.microsoft.com/office/drawing/2010/main" val="0"/>
+              </a:ext>
+            </a:extLst>
+          </a:blip>
+          <a:srcRect/>
+          <a:stretch>
+            <a:fillRect/>
+          </a:stretch>
+        </p:blipFill>
+        <p:spPr bwMode="auto">
+          <a:xfrm>
+            <a:off x="1216555" y="643467"/>
+            <a:ext cx="9758890" cy="5050225"/>
+          </a:xfrm>
+          <a:prstGeom prst="rect">
+            <a:avLst/>
+          </a:prstGeom>
+          <a:noFill/>
+          <a:extLst>
+            <a:ext uri="{909E8E84-426E-40DD-AFC4-6F175D3DCCD1}">
+              <a14:hiddenFill xmlns:a14="http://schemas.microsoft.com/office/drawing/2010/main">
+                <a:solidFill>
+                  <a:srgbClr val="FFFFFF"/>
+                </a:solidFill>
+              </a14:hiddenFill>
+            </a:ext>
+          </a:extLst>
+        </p:spPr>
+      </p:pic>
+      <p:sp>
+        <p:nvSpPr>
+          <p:cNvPr id="2" name="Footer Placeholder 1">
+            <a:extLst>
+              <a:ext uri="{FF2B5EF4-FFF2-40B4-BE49-F238E27FC236}">
+                <a16:creationId xmlns:a16="http://schemas.microsoft.com/office/drawing/2014/main" id="{E67A1D84-3C9E-4820-B2D6-B13BE1E6BC2E}"/>
+              </a:ext>
+            </a:extLst>
+          </p:cNvPr>
+          <p:cNvSpPr>
+            <a:spLocks noGrp="1"/>
+          </p:cNvSpPr>
+          <p:nvPr>
+            <p:ph type="ftr" sz="quarter" idx="11"/>
+          </p:nvPr>
+        </p:nvSpPr>
+        <p:spPr>
+          <a:xfrm>
+            <a:off x="3686185" y="6459785"/>
+            <a:ext cx="4822804" cy="365125"/>
+          </a:xfrm>
+        </p:spPr>
+        <p:txBody>
+          <a:bodyPr>
+            <a:normAutofit/>
+          </a:bodyPr>
+          <a:lstStyle/>
+          <a:p>
+            <a:pPr>
+              <a:spcAft>
+                <a:spcPts val="600"/>
+              </a:spcAft>
+            </a:pPr>
+            <a:r>
+              <a:rPr lang="en-US"/>
+              <a:t>Add a footer</a:t>
+            </a:r>
+          </a:p>
+        </p:txBody>
+      </p:sp>
+    </p:spTree>
+    <p:extLst>
+      <p:ext uri="{BB962C8B-B14F-4D97-AF65-F5344CB8AC3E}">
+        <p14:creationId xmlns:p14="http://schemas.microsoft.com/office/powerpoint/2010/main" val="3995111277"/>
+      </p:ext>
+    </p:extLst>
+  </p:cSld>
+  <p:clrMapOvr>
+    <a:masterClrMapping/>
+  </p:clrMapOvr>
+  <mc:AlternateContent xmlns:mc="http://schemas.openxmlformats.org/markup-compatibility/2006" xmlns:p14="http://schemas.microsoft.com/office/powerpoint/2010/main">
+    <mc:Choice Requires="p14">
+      <p:transition spd="med" p14:dur="700">
+        <p:fade/>
+      </p:transition>
+    </mc:Choice>
+    <mc:Fallback xmlns="">
+      <p:transition spd="med">
+        <p:fade/>
+      </p:transition>
+    </mc:Fallback>
+  </mc:AlternateContent>
+</p:sld>
+</file>
+
+<file path=ppt/slides/slide13.xml><?xml version="1.0" encoding="utf-8"?>
+<p:sld xmlns:a="http://schemas.openxmlformats.org/drawingml/2006/main" xmlns:r="http://schemas.openxmlformats.org/officeDocument/2006/relationships" xmlns:p="http://schemas.openxmlformats.org/presentationml/2006/main">
+  <p:cSld>
+    <p:bg>
+      <p:bgPr>
+        <a:solidFill>
+          <a:schemeClr val="bg1"/>
+        </a:solidFill>
+        <a:effectLst/>
+      </p:bgPr>
+    </p:bg>
+    <p:spTree>
+      <p:nvGrpSpPr>
+        <p:cNvPr id="1" name=""/>
+        <p:cNvGrpSpPr/>
+        <p:nvPr/>
+      </p:nvGrpSpPr>
+      <p:grpSpPr>
+        <a:xfrm>
+          <a:off x="0" y="0"/>
+          <a:ext cx="0" cy="0"/>
+          <a:chOff x="0" y="0"/>
+          <a:chExt cx="0" cy="0"/>
+        </a:xfrm>
+      </p:grpSpPr>
+      <p:pic>
+        <p:nvPicPr>
+          <p:cNvPr id="9218" name="Picture 2" descr="Forms response chart. Question title: The symbol for current is. Number of responses: 12 / 18 correct responses.">
+            <a:extLst>
+              <a:ext uri="{FF2B5EF4-FFF2-40B4-BE49-F238E27FC236}">
+                <a16:creationId xmlns:a16="http://schemas.microsoft.com/office/drawing/2014/main" id="{A070A5D2-3E1C-46C2-BCA3-757EBB2C95A6}"/>
+              </a:ext>
+            </a:extLst>
+          </p:cNvPr>
+          <p:cNvPicPr>
+            <a:picLocks noChangeAspect="1" noChangeArrowheads="1"/>
+          </p:cNvPicPr>
+          <p:nvPr/>
+        </p:nvPicPr>
+        <p:blipFill>
+          <a:blip r:embed="rId2">
+            <a:extLst>
+              <a:ext uri="{28A0092B-C50C-407E-A947-70E740481C1C}">
+                <a14:useLocalDpi xmlns:a14="http://schemas.microsoft.com/office/drawing/2010/main" val="0"/>
+              </a:ext>
+            </a:extLst>
+          </a:blip>
+          <a:srcRect/>
+          <a:stretch>
+            <a:fillRect/>
+          </a:stretch>
+        </p:blipFill>
+        <p:spPr bwMode="auto">
+          <a:xfrm>
+            <a:off x="1216555" y="643467"/>
+            <a:ext cx="9758890" cy="5050225"/>
+          </a:xfrm>
+          <a:prstGeom prst="rect">
+            <a:avLst/>
+          </a:prstGeom>
+          <a:noFill/>
+          <a:extLst>
+            <a:ext uri="{909E8E84-426E-40DD-AFC4-6F175D3DCCD1}">
+              <a14:hiddenFill xmlns:a14="http://schemas.microsoft.com/office/drawing/2010/main">
+                <a:solidFill>
+                  <a:srgbClr val="FFFFFF"/>
+                </a:solidFill>
+              </a14:hiddenFill>
+            </a:ext>
+          </a:extLst>
+        </p:spPr>
+      </p:pic>
+      <p:sp>
+        <p:nvSpPr>
+          <p:cNvPr id="2" name="Footer Placeholder 1">
+            <a:extLst>
+              <a:ext uri="{FF2B5EF4-FFF2-40B4-BE49-F238E27FC236}">
+                <a16:creationId xmlns:a16="http://schemas.microsoft.com/office/drawing/2014/main" id="{BE7A28A9-574F-45E8-ABAE-34236940E8B3}"/>
+              </a:ext>
+            </a:extLst>
+          </p:cNvPr>
+          <p:cNvSpPr>
+            <a:spLocks noGrp="1"/>
+          </p:cNvSpPr>
+          <p:nvPr>
+            <p:ph type="ftr" sz="quarter" idx="11"/>
+          </p:nvPr>
+        </p:nvSpPr>
+        <p:spPr>
+          <a:xfrm>
+            <a:off x="3686185" y="6459785"/>
+            <a:ext cx="4822804" cy="365125"/>
+          </a:xfrm>
+        </p:spPr>
+        <p:txBody>
+          <a:bodyPr>
+            <a:normAutofit/>
+          </a:bodyPr>
+          <a:lstStyle/>
+          <a:p>
+            <a:pPr>
+              <a:spcAft>
+                <a:spcPts val="600"/>
+              </a:spcAft>
+            </a:pPr>
+            <a:r>
+              <a:rPr lang="en-US"/>
+              <a:t>Add a footer</a:t>
+            </a:r>
+          </a:p>
+        </p:txBody>
+      </p:sp>
+    </p:spTree>
+    <p:extLst>
+      <p:ext uri="{BB962C8B-B14F-4D97-AF65-F5344CB8AC3E}">
+        <p14:creationId xmlns:p14="http://schemas.microsoft.com/office/powerpoint/2010/main" val="4195553928"/>
+      </p:ext>
+    </p:extLst>
+  </p:cSld>
+  <p:clrMapOvr>
+    <a:masterClrMapping/>
+  </p:clrMapOvr>
+  <mc:AlternateContent xmlns:mc="http://schemas.openxmlformats.org/markup-compatibility/2006" xmlns:p14="http://schemas.microsoft.com/office/powerpoint/2010/main">
+    <mc:Choice Requires="p14">
+      <p:transition spd="med" p14:dur="700">
+        <p:fade/>
+      </p:transition>
+    </mc:Choice>
+    <mc:Fallback xmlns="">
+      <p:transition spd="med">
+        <p:fade/>
+      </p:transition>
+    </mc:Fallback>
+  </mc:AlternateContent>
+</p:sld>
+</file>
+
+<file path=ppt/slides/slide14.xml><?xml version="1.0" encoding="utf-8"?>
+<p:sld xmlns:a="http://schemas.openxmlformats.org/drawingml/2006/main" xmlns:r="http://schemas.openxmlformats.org/officeDocument/2006/relationships" xmlns:p="http://schemas.openxmlformats.org/presentationml/2006/main">
+  <p:cSld>
+    <p:bg>
+      <p:bgPr>
+        <a:solidFill>
+          <a:schemeClr val="bg1"/>
+        </a:solidFill>
+        <a:effectLst/>
+      </p:bgPr>
+    </p:bg>
+    <p:spTree>
+      <p:nvGrpSpPr>
+        <p:cNvPr id="1" name=""/>
+        <p:cNvGrpSpPr/>
+        <p:nvPr/>
+      </p:nvGrpSpPr>
+      <p:grpSpPr>
+        <a:xfrm>
+          <a:off x="0" y="0"/>
+          <a:ext cx="0" cy="0"/>
+          <a:chOff x="0" y="0"/>
+          <a:chExt cx="0" cy="0"/>
+        </a:xfrm>
+      </p:grpSpPr>
+      <p:pic>
+        <p:nvPicPr>
+          <p:cNvPr id="10242" name="Picture 2" descr="Forms response chart. Question title: The french physcist and mathematician known for the discovery and measurement of current is. Number of responses: 17 / 18 correct responses.">
+            <a:extLst>
+              <a:ext uri="{FF2B5EF4-FFF2-40B4-BE49-F238E27FC236}">
+                <a16:creationId xmlns:a16="http://schemas.microsoft.com/office/drawing/2014/main" id="{A6D1AA89-41EE-44D3-8732-6C521D428CD2}"/>
+              </a:ext>
+            </a:extLst>
+          </p:cNvPr>
+          <p:cNvPicPr>
+            <a:picLocks noChangeAspect="1" noChangeArrowheads="1"/>
+          </p:cNvPicPr>
+          <p:nvPr/>
+        </p:nvPicPr>
+        <p:blipFill>
+          <a:blip r:embed="rId2">
+            <a:extLst>
+              <a:ext uri="{28A0092B-C50C-407E-A947-70E740481C1C}">
+                <a14:useLocalDpi xmlns:a14="http://schemas.microsoft.com/office/drawing/2010/main" val="0"/>
+              </a:ext>
+            </a:extLst>
+          </a:blip>
+          <a:srcRect/>
+          <a:stretch>
+            <a:fillRect/>
+          </a:stretch>
+        </p:blipFill>
+        <p:spPr bwMode="auto">
+          <a:xfrm>
+            <a:off x="1566649" y="643467"/>
+            <a:ext cx="9058702" cy="5050225"/>
+          </a:xfrm>
+          <a:prstGeom prst="rect">
+            <a:avLst/>
+          </a:prstGeom>
+          <a:noFill/>
+          <a:extLst>
+            <a:ext uri="{909E8E84-426E-40DD-AFC4-6F175D3DCCD1}">
+              <a14:hiddenFill xmlns:a14="http://schemas.microsoft.com/office/drawing/2010/main">
+                <a:solidFill>
+                  <a:srgbClr val="FFFFFF"/>
+                </a:solidFill>
+              </a14:hiddenFill>
+            </a:ext>
+          </a:extLst>
+        </p:spPr>
+      </p:pic>
+      <p:sp>
+        <p:nvSpPr>
+          <p:cNvPr id="2" name="Footer Placeholder 1">
+            <a:extLst>
+              <a:ext uri="{FF2B5EF4-FFF2-40B4-BE49-F238E27FC236}">
+                <a16:creationId xmlns:a16="http://schemas.microsoft.com/office/drawing/2014/main" id="{AC7B6AC9-6C2F-44EA-8CEF-80FAEE895CA4}"/>
+              </a:ext>
+            </a:extLst>
+          </p:cNvPr>
+          <p:cNvSpPr>
+            <a:spLocks noGrp="1"/>
+          </p:cNvSpPr>
+          <p:nvPr>
+            <p:ph type="ftr" sz="quarter" idx="11"/>
+          </p:nvPr>
+        </p:nvSpPr>
+        <p:spPr>
+          <a:xfrm>
+            <a:off x="3686185" y="6459785"/>
+            <a:ext cx="4822804" cy="365125"/>
+          </a:xfrm>
+        </p:spPr>
+        <p:txBody>
+          <a:bodyPr>
+            <a:normAutofit/>
+          </a:bodyPr>
+          <a:lstStyle/>
+          <a:p>
+            <a:pPr>
+              <a:spcAft>
+                <a:spcPts val="600"/>
+              </a:spcAft>
+            </a:pPr>
+            <a:r>
+              <a:rPr lang="en-US"/>
+              <a:t>Add a footer</a:t>
+            </a:r>
+          </a:p>
+        </p:txBody>
+      </p:sp>
+    </p:spTree>
+    <p:extLst>
+      <p:ext uri="{BB962C8B-B14F-4D97-AF65-F5344CB8AC3E}">
+        <p14:creationId xmlns:p14="http://schemas.microsoft.com/office/powerpoint/2010/main" val="3310801417"/>
+      </p:ext>
+    </p:extLst>
+  </p:cSld>
+  <p:clrMapOvr>
+    <a:masterClrMapping/>
+  </p:clrMapOvr>
+  <mc:AlternateContent xmlns:mc="http://schemas.openxmlformats.org/markup-compatibility/2006" xmlns:p14="http://schemas.microsoft.com/office/powerpoint/2010/main">
+    <mc:Choice Requires="p14">
+      <p:transition spd="med" p14:dur="700">
+        <p:fade/>
+      </p:transition>
+    </mc:Choice>
+    <mc:Fallback xmlns="">
+      <p:transition spd="med">
+        <p:fade/>
+      </p:transition>
+    </mc:Fallback>
+  </mc:AlternateContent>
+</p:sld>
+</file>
+
+<file path=ppt/slides/slide15.xml><?xml version="1.0" encoding="utf-8"?>
+<p:sld xmlns:a="http://schemas.openxmlformats.org/drawingml/2006/main" xmlns:r="http://schemas.openxmlformats.org/officeDocument/2006/relationships" xmlns:p="http://schemas.openxmlformats.org/presentationml/2006/main">
+  <p:cSld>
+    <p:bg>
+      <p:bgPr>
+        <a:solidFill>
+          <a:schemeClr val="bg1"/>
+        </a:solidFill>
+        <a:effectLst/>
+      </p:bgPr>
+    </p:bg>
+    <p:spTree>
+      <p:nvGrpSpPr>
+        <p:cNvPr id="1" name=""/>
+        <p:cNvGrpSpPr/>
+        <p:nvPr/>
+      </p:nvGrpSpPr>
+      <p:grpSpPr>
+        <a:xfrm>
+          <a:off x="0" y="0"/>
+          <a:ext cx="0" cy="0"/>
+          <a:chOff x="0" y="0"/>
+          <a:chExt cx="0" cy="0"/>
+        </a:xfrm>
+      </p:grpSpPr>
+      <p:pic>
+        <p:nvPicPr>
+          <p:cNvPr id="11266" name="Picture 2" descr="Forms response chart. Question title: The unit of resistance discovered by german physicist Georg Simon Ohm is called. Number of responses: 16 / 18 correct responses.">
+            <a:extLst>
+              <a:ext uri="{FF2B5EF4-FFF2-40B4-BE49-F238E27FC236}">
+                <a16:creationId xmlns:a16="http://schemas.microsoft.com/office/drawing/2014/main" id="{4E745818-39F8-4E75-9B29-AFEF6D52ED56}"/>
+              </a:ext>
+            </a:extLst>
+          </p:cNvPr>
+          <p:cNvPicPr>
+            <a:picLocks noChangeAspect="1" noChangeArrowheads="1"/>
+          </p:cNvPicPr>
+          <p:nvPr/>
+        </p:nvPicPr>
+        <p:blipFill>
+          <a:blip r:embed="rId2">
+            <a:extLst>
+              <a:ext uri="{28A0092B-C50C-407E-A947-70E740481C1C}">
+                <a14:useLocalDpi xmlns:a14="http://schemas.microsoft.com/office/drawing/2010/main" val="0"/>
+              </a:ext>
+            </a:extLst>
+          </a:blip>
+          <a:srcRect/>
+          <a:stretch>
+            <a:fillRect/>
+          </a:stretch>
+        </p:blipFill>
+        <p:spPr bwMode="auto">
+          <a:xfrm>
+            <a:off x="1566649" y="643467"/>
+            <a:ext cx="9058702" cy="5050225"/>
+          </a:xfrm>
+          <a:prstGeom prst="rect">
+            <a:avLst/>
+          </a:prstGeom>
+          <a:noFill/>
+          <a:extLst>
+            <a:ext uri="{909E8E84-426E-40DD-AFC4-6F175D3DCCD1}">
+              <a14:hiddenFill xmlns:a14="http://schemas.microsoft.com/office/drawing/2010/main">
+                <a:solidFill>
+                  <a:srgbClr val="FFFFFF"/>
+                </a:solidFill>
+              </a14:hiddenFill>
+            </a:ext>
+          </a:extLst>
+        </p:spPr>
+      </p:pic>
+      <p:sp>
+        <p:nvSpPr>
+          <p:cNvPr id="2" name="Footer Placeholder 1">
+            <a:extLst>
+              <a:ext uri="{FF2B5EF4-FFF2-40B4-BE49-F238E27FC236}">
+                <a16:creationId xmlns:a16="http://schemas.microsoft.com/office/drawing/2014/main" id="{6816DA12-44B5-499E-8435-9BF8A21F5617}"/>
+              </a:ext>
+            </a:extLst>
+          </p:cNvPr>
+          <p:cNvSpPr>
+            <a:spLocks noGrp="1"/>
+          </p:cNvSpPr>
+          <p:nvPr>
+            <p:ph type="ftr" sz="quarter" idx="11"/>
+          </p:nvPr>
+        </p:nvSpPr>
+        <p:spPr>
+          <a:xfrm>
+            <a:off x="3686185" y="6459785"/>
+            <a:ext cx="4822804" cy="365125"/>
+          </a:xfrm>
+        </p:spPr>
+        <p:txBody>
+          <a:bodyPr>
+            <a:normAutofit/>
+          </a:bodyPr>
+          <a:lstStyle/>
+          <a:p>
+            <a:pPr>
+              <a:spcAft>
+                <a:spcPts val="600"/>
+              </a:spcAft>
+            </a:pPr>
+            <a:r>
+              <a:rPr lang="en-US"/>
+              <a:t>Add a footer</a:t>
+            </a:r>
+          </a:p>
+        </p:txBody>
+      </p:sp>
+    </p:spTree>
+    <p:extLst>
+      <p:ext uri="{BB962C8B-B14F-4D97-AF65-F5344CB8AC3E}">
+        <p14:creationId xmlns:p14="http://schemas.microsoft.com/office/powerpoint/2010/main" val="802363653"/>
+      </p:ext>
+    </p:extLst>
+  </p:cSld>
+  <p:clrMapOvr>
+    <a:masterClrMapping/>
+  </p:clrMapOvr>
+  <mc:AlternateContent xmlns:mc="http://schemas.openxmlformats.org/markup-compatibility/2006" xmlns:p14="http://schemas.microsoft.com/office/powerpoint/2010/main">
+    <mc:Choice Requires="p14">
+      <p:transition spd="med" p14:dur="700">
+        <p:fade/>
+      </p:transition>
+    </mc:Choice>
+    <mc:Fallback xmlns="">
+      <p:transition spd="med">
+        <p:fade/>
+      </p:transition>
+    </mc:Fallback>
+  </mc:AlternateContent>
+</p:sld>
+</file>
+
+<file path=ppt/slides/slide16.xml><?xml version="1.0" encoding="utf-8"?>
+<p:sld xmlns:a="http://schemas.openxmlformats.org/drawingml/2006/main" xmlns:r="http://schemas.openxmlformats.org/officeDocument/2006/relationships" xmlns:p="http://schemas.openxmlformats.org/presentationml/2006/main">
+  <p:cSld>
+    <p:bg>
+      <p:bgPr>
+        <a:solidFill>
+          <a:schemeClr val="bg1"/>
+        </a:solidFill>
+        <a:effectLst/>
+      </p:bgPr>
+    </p:bg>
+    <p:spTree>
+      <p:nvGrpSpPr>
+        <p:cNvPr id="1" name=""/>
+        <p:cNvGrpSpPr/>
+        <p:nvPr/>
+      </p:nvGrpSpPr>
+      <p:grpSpPr>
+        <a:xfrm>
+          <a:off x="0" y="0"/>
+          <a:ext cx="0" cy="0"/>
+          <a:chOff x="0" y="0"/>
+          <a:chExt cx="0" cy="0"/>
+        </a:xfrm>
+      </p:grpSpPr>
+      <p:pic>
+        <p:nvPicPr>
+          <p:cNvPr id="12290" name="Picture 2" descr="Forms response chart. Question title: A parallel circuit has. Number of responses: 17 / 18 correct responses.">
+            <a:extLst>
+              <a:ext uri="{FF2B5EF4-FFF2-40B4-BE49-F238E27FC236}">
+                <a16:creationId xmlns:a16="http://schemas.microsoft.com/office/drawing/2014/main" id="{2D8E2CFE-3E05-4EDA-A021-6510981EBD81}"/>
+              </a:ext>
+            </a:extLst>
+          </p:cNvPr>
+          <p:cNvPicPr>
+            <a:picLocks noChangeAspect="1" noChangeArrowheads="1"/>
+          </p:cNvPicPr>
+          <p:nvPr/>
+        </p:nvPicPr>
+        <p:blipFill>
+          <a:blip r:embed="rId2">
+            <a:extLst>
+              <a:ext uri="{28A0092B-C50C-407E-A947-70E740481C1C}">
+                <a14:useLocalDpi xmlns:a14="http://schemas.microsoft.com/office/drawing/2010/main" val="0"/>
+              </a:ext>
+            </a:extLst>
+          </a:blip>
+          <a:srcRect/>
+          <a:stretch>
+            <a:fillRect/>
+          </a:stretch>
+        </p:blipFill>
+        <p:spPr bwMode="auto">
+          <a:xfrm>
+            <a:off x="1216555" y="643467"/>
+            <a:ext cx="9758890" cy="5050225"/>
+          </a:xfrm>
+          <a:prstGeom prst="rect">
+            <a:avLst/>
+          </a:prstGeom>
+          <a:noFill/>
+          <a:extLst>
+            <a:ext uri="{909E8E84-426E-40DD-AFC4-6F175D3DCCD1}">
+              <a14:hiddenFill xmlns:a14="http://schemas.microsoft.com/office/drawing/2010/main">
+                <a:solidFill>
+                  <a:srgbClr val="FFFFFF"/>
+                </a:solidFill>
+              </a14:hiddenFill>
+            </a:ext>
+          </a:extLst>
+        </p:spPr>
+      </p:pic>
+      <p:sp>
+        <p:nvSpPr>
+          <p:cNvPr id="2" name="Footer Placeholder 1">
+            <a:extLst>
+              <a:ext uri="{FF2B5EF4-FFF2-40B4-BE49-F238E27FC236}">
+                <a16:creationId xmlns:a16="http://schemas.microsoft.com/office/drawing/2014/main" id="{40CF9460-90B1-433C-9D71-34980AA9A3D8}"/>
+              </a:ext>
+            </a:extLst>
+          </p:cNvPr>
+          <p:cNvSpPr>
+            <a:spLocks noGrp="1"/>
+          </p:cNvSpPr>
+          <p:nvPr>
+            <p:ph type="ftr" sz="quarter" idx="11"/>
+          </p:nvPr>
+        </p:nvSpPr>
+        <p:spPr>
+          <a:xfrm>
+            <a:off x="3686185" y="6459785"/>
+            <a:ext cx="4822804" cy="365125"/>
+          </a:xfrm>
+        </p:spPr>
+        <p:txBody>
+          <a:bodyPr>
+            <a:normAutofit/>
+          </a:bodyPr>
+          <a:lstStyle/>
+          <a:p>
+            <a:pPr>
+              <a:spcAft>
+                <a:spcPts val="600"/>
+              </a:spcAft>
+            </a:pPr>
+            <a:r>
+              <a:rPr lang="en-US"/>
+              <a:t>Add a footer</a:t>
+            </a:r>
+          </a:p>
+        </p:txBody>
+      </p:sp>
+    </p:spTree>
+    <p:extLst>
+      <p:ext uri="{BB962C8B-B14F-4D97-AF65-F5344CB8AC3E}">
+        <p14:creationId xmlns:p14="http://schemas.microsoft.com/office/powerpoint/2010/main" val="3761051897"/>
+      </p:ext>
+    </p:extLst>
+  </p:cSld>
+  <p:clrMapOvr>
+    <a:masterClrMapping/>
+  </p:clrMapOvr>
+  <mc:AlternateContent xmlns:mc="http://schemas.openxmlformats.org/markup-compatibility/2006" xmlns:p14="http://schemas.microsoft.com/office/powerpoint/2010/main">
+    <mc:Choice Requires="p14">
+      <p:transition spd="med" p14:dur="700">
+        <p:fade/>
+      </p:transition>
+    </mc:Choice>
+    <mc:Fallback xmlns="">
+      <p:transition spd="med">
+        <p:fade/>
+      </p:transition>
+    </mc:Fallback>
+  </mc:AlternateContent>
+</p:sld>
+</file>
+
+<file path=ppt/slides/slide17.xml><?xml version="1.0" encoding="utf-8"?>
+<p:sld xmlns:a="http://schemas.openxmlformats.org/drawingml/2006/main" xmlns:r="http://schemas.openxmlformats.org/officeDocument/2006/relationships" xmlns:p="http://schemas.openxmlformats.org/presentationml/2006/main">
+  <p:cSld>
+    <p:bg>
+      <p:bgPr>
+        <a:solidFill>
+          <a:schemeClr val="bg1"/>
+        </a:solidFill>
+        <a:effectLst/>
+      </p:bgPr>
+    </p:bg>
+    <p:spTree>
+      <p:nvGrpSpPr>
+        <p:cNvPr id="1" name=""/>
+        <p:cNvGrpSpPr/>
+        <p:nvPr/>
+      </p:nvGrpSpPr>
+      <p:grpSpPr>
+        <a:xfrm>
+          <a:off x="0" y="0"/>
+          <a:ext cx="0" cy="0"/>
+          <a:chOff x="0" y="0"/>
+          <a:chExt cx="0" cy="0"/>
+        </a:xfrm>
+      </p:grpSpPr>
+      <p:pic>
+        <p:nvPicPr>
+          <p:cNvPr id="13314" name="Picture 2" descr="Forms response chart. Question title: When soldering, always be sure to utilize ___________ to clean the tip of your soldering iron. Number of responses: 18 / 18 correct responses.">
+            <a:extLst>
+              <a:ext uri="{FF2B5EF4-FFF2-40B4-BE49-F238E27FC236}">
+                <a16:creationId xmlns:a16="http://schemas.microsoft.com/office/drawing/2014/main" id="{943B2F53-5F5D-4E0D-8E7E-E87CCFB5B029}"/>
+              </a:ext>
+            </a:extLst>
+          </p:cNvPr>
+          <p:cNvPicPr>
+            <a:picLocks noChangeAspect="1" noChangeArrowheads="1"/>
+          </p:cNvPicPr>
+          <p:nvPr/>
+        </p:nvPicPr>
+        <p:blipFill>
+          <a:blip r:embed="rId2">
+            <a:extLst>
+              <a:ext uri="{28A0092B-C50C-407E-A947-70E740481C1C}">
+                <a14:useLocalDpi xmlns:a14="http://schemas.microsoft.com/office/drawing/2010/main" val="0"/>
+              </a:ext>
+            </a:extLst>
+          </a:blip>
+          <a:srcRect/>
+          <a:stretch>
+            <a:fillRect/>
+          </a:stretch>
+        </p:blipFill>
+        <p:spPr bwMode="auto">
+          <a:xfrm>
+            <a:off x="1566649" y="643467"/>
+            <a:ext cx="9058702" cy="5050225"/>
+          </a:xfrm>
+          <a:prstGeom prst="rect">
+            <a:avLst/>
+          </a:prstGeom>
+          <a:noFill/>
+          <a:extLst>
+            <a:ext uri="{909E8E84-426E-40DD-AFC4-6F175D3DCCD1}">
+              <a14:hiddenFill xmlns:a14="http://schemas.microsoft.com/office/drawing/2010/main">
+                <a:solidFill>
+                  <a:srgbClr val="FFFFFF"/>
+                </a:solidFill>
+              </a14:hiddenFill>
+            </a:ext>
+          </a:extLst>
+        </p:spPr>
+      </p:pic>
+      <p:sp>
+        <p:nvSpPr>
+          <p:cNvPr id="2" name="Footer Placeholder 1">
+            <a:extLst>
+              <a:ext uri="{FF2B5EF4-FFF2-40B4-BE49-F238E27FC236}">
+                <a16:creationId xmlns:a16="http://schemas.microsoft.com/office/drawing/2014/main" id="{9F8D95B9-C09A-4257-822C-8EA5A982121C}"/>
+              </a:ext>
+            </a:extLst>
+          </p:cNvPr>
+          <p:cNvSpPr>
+            <a:spLocks noGrp="1"/>
+          </p:cNvSpPr>
+          <p:nvPr>
+            <p:ph type="ftr" sz="quarter" idx="11"/>
+          </p:nvPr>
+        </p:nvSpPr>
+        <p:spPr>
+          <a:xfrm>
+            <a:off x="3686185" y="6459785"/>
+            <a:ext cx="4822804" cy="365125"/>
+          </a:xfrm>
+        </p:spPr>
+        <p:txBody>
+          <a:bodyPr>
+            <a:normAutofit/>
+          </a:bodyPr>
+          <a:lstStyle/>
+          <a:p>
+            <a:pPr>
+              <a:spcAft>
+                <a:spcPts val="600"/>
+              </a:spcAft>
+            </a:pPr>
+            <a:r>
+              <a:rPr lang="en-US"/>
+              <a:t>Add a footer</a:t>
+            </a:r>
+          </a:p>
+        </p:txBody>
+      </p:sp>
+    </p:spTree>
+    <p:extLst>
+      <p:ext uri="{BB962C8B-B14F-4D97-AF65-F5344CB8AC3E}">
+        <p14:creationId xmlns:p14="http://schemas.microsoft.com/office/powerpoint/2010/main" val="3271011615"/>
+      </p:ext>
+    </p:extLst>
+  </p:cSld>
+  <p:clrMapOvr>
+    <a:masterClrMapping/>
+  </p:clrMapOvr>
+  <mc:AlternateContent xmlns:mc="http://schemas.openxmlformats.org/markup-compatibility/2006" xmlns:p14="http://schemas.microsoft.com/office/powerpoint/2010/main">
+    <mc:Choice Requires="p14">
+      <p:transition spd="med" p14:dur="700">
+        <p:fade/>
+      </p:transition>
+    </mc:Choice>
+    <mc:Fallback xmlns="">
+      <p:transition spd="med">
+        <p:fade/>
+      </p:transition>
+    </mc:Fallback>
+  </mc:AlternateContent>
+</p:sld>
+</file>
+
+<file path=ppt/slides/slide18.xml><?xml version="1.0" encoding="utf-8"?>
+<p:sld xmlns:a="http://schemas.openxmlformats.org/drawingml/2006/main" xmlns:r="http://schemas.openxmlformats.org/officeDocument/2006/relationships" xmlns:p="http://schemas.openxmlformats.org/presentationml/2006/main">
+  <p:cSld>
+    <p:bg>
+      <p:bgPr>
+        <a:solidFill>
+          <a:schemeClr val="bg1"/>
+        </a:solidFill>
+        <a:effectLst/>
+      </p:bgPr>
+    </p:bg>
+    <p:spTree>
+      <p:nvGrpSpPr>
+        <p:cNvPr id="1" name=""/>
+        <p:cNvGrpSpPr/>
+        <p:nvPr/>
+      </p:nvGrpSpPr>
+      <p:grpSpPr>
+        <a:xfrm>
+          <a:off x="0" y="0"/>
+          <a:ext cx="0" cy="0"/>
+          <a:chOff x="0" y="0"/>
+          <a:chExt cx="0" cy="0"/>
+        </a:xfrm>
+      </p:grpSpPr>
+      <p:pic>
+        <p:nvPicPr>
+          <p:cNvPr id="14338" name="Picture 2" descr="Forms response chart. Question title: How can you identify a resistors resistance and tolerance?. Number of responses: 18 / 18 correct responses.">
+            <a:extLst>
+              <a:ext uri="{FF2B5EF4-FFF2-40B4-BE49-F238E27FC236}">
+                <a16:creationId xmlns:a16="http://schemas.microsoft.com/office/drawing/2014/main" id="{13608BD9-D6F9-4B39-8581-72A32B4CE140}"/>
+              </a:ext>
+            </a:extLst>
+          </p:cNvPr>
+          <p:cNvPicPr>
+            <a:picLocks noChangeAspect="1" noChangeArrowheads="1"/>
+          </p:cNvPicPr>
+          <p:nvPr/>
+        </p:nvPicPr>
+        <p:blipFill>
+          <a:blip r:embed="rId2">
+            <a:extLst>
+              <a:ext uri="{28A0092B-C50C-407E-A947-70E740481C1C}">
+                <a14:useLocalDpi xmlns:a14="http://schemas.microsoft.com/office/drawing/2010/main" val="0"/>
+              </a:ext>
+            </a:extLst>
+          </a:blip>
+          <a:srcRect/>
+          <a:stretch>
+            <a:fillRect/>
+          </a:stretch>
+        </p:blipFill>
+        <p:spPr bwMode="auto">
+          <a:xfrm>
+            <a:off x="1216555" y="643467"/>
+            <a:ext cx="9758890" cy="5050225"/>
+          </a:xfrm>
+          <a:prstGeom prst="rect">
+            <a:avLst/>
+          </a:prstGeom>
+          <a:noFill/>
+          <a:extLst>
+            <a:ext uri="{909E8E84-426E-40DD-AFC4-6F175D3DCCD1}">
+              <a14:hiddenFill xmlns:a14="http://schemas.microsoft.com/office/drawing/2010/main">
+                <a:solidFill>
+                  <a:srgbClr val="FFFFFF"/>
+                </a:solidFill>
+              </a14:hiddenFill>
+            </a:ext>
+          </a:extLst>
+        </p:spPr>
+      </p:pic>
+      <p:sp>
+        <p:nvSpPr>
+          <p:cNvPr id="2" name="Footer Placeholder 1">
+            <a:extLst>
+              <a:ext uri="{FF2B5EF4-FFF2-40B4-BE49-F238E27FC236}">
+                <a16:creationId xmlns:a16="http://schemas.microsoft.com/office/drawing/2014/main" id="{0DD7E300-28BA-4F75-AB06-D0C45DFFF6A8}"/>
+              </a:ext>
+            </a:extLst>
+          </p:cNvPr>
+          <p:cNvSpPr>
+            <a:spLocks noGrp="1"/>
+          </p:cNvSpPr>
+          <p:nvPr>
+            <p:ph type="ftr" sz="quarter" idx="11"/>
+          </p:nvPr>
+        </p:nvSpPr>
+        <p:spPr>
+          <a:xfrm>
+            <a:off x="3686185" y="6459785"/>
+            <a:ext cx="4822804" cy="365125"/>
+          </a:xfrm>
+        </p:spPr>
+        <p:txBody>
+          <a:bodyPr>
+            <a:normAutofit/>
+          </a:bodyPr>
+          <a:lstStyle/>
+          <a:p>
+            <a:pPr>
+              <a:spcAft>
+                <a:spcPts val="600"/>
+              </a:spcAft>
+            </a:pPr>
+            <a:r>
+              <a:rPr lang="en-US"/>
+              <a:t>Add a footer</a:t>
+            </a:r>
+          </a:p>
+        </p:txBody>
+      </p:sp>
+    </p:spTree>
+    <p:extLst>
+      <p:ext uri="{BB962C8B-B14F-4D97-AF65-F5344CB8AC3E}">
+        <p14:creationId xmlns:p14="http://schemas.microsoft.com/office/powerpoint/2010/main" val="4000269097"/>
+      </p:ext>
+    </p:extLst>
+  </p:cSld>
+  <p:clrMapOvr>
+    <a:masterClrMapping/>
+  </p:clrMapOvr>
+  <mc:AlternateContent xmlns:mc="http://schemas.openxmlformats.org/markup-compatibility/2006" xmlns:p14="http://schemas.microsoft.com/office/powerpoint/2010/main">
+    <mc:Choice Requires="p14">
+      <p:transition spd="med" p14:dur="700">
+        <p:fade/>
+      </p:transition>
+    </mc:Choice>
+    <mc:Fallback xmlns="">
+      <p:transition spd="med">
+        <p:fade/>
+      </p:transition>
+    </mc:Fallback>
+  </mc:AlternateContent>
+</p:sld>
+</file>
+
+<file path=ppt/slides/slide19.xml><?xml version="1.0" encoding="utf-8"?>
+<p:sld xmlns:a="http://schemas.openxmlformats.org/drawingml/2006/main" xmlns:r="http://schemas.openxmlformats.org/officeDocument/2006/relationships" xmlns:p="http://schemas.openxmlformats.org/presentationml/2006/main">
+  <p:cSld>
+    <p:bg>
+      <p:bgPr>
+        <a:solidFill>
+          <a:schemeClr val="bg1"/>
+        </a:solidFill>
+        <a:effectLst/>
+      </p:bgPr>
+    </p:bg>
+    <p:spTree>
+      <p:nvGrpSpPr>
+        <p:cNvPr id="1" name=""/>
+        <p:cNvGrpSpPr/>
+        <p:nvPr/>
+      </p:nvGrpSpPr>
+      <p:grpSpPr>
+        <a:xfrm>
+          <a:off x="0" y="0"/>
+          <a:ext cx="0" cy="0"/>
+          <a:chOff x="0" y="0"/>
+          <a:chExt cx="0" cy="0"/>
+        </a:xfrm>
+      </p:grpSpPr>
+      <p:pic>
+        <p:nvPicPr>
+          <p:cNvPr id="15362" name="Picture 2" descr="Forms response chart. Question title: Select which one is a soldering iron. Number of responses: 18 / 18 correct responses.">
+            <a:extLst>
+              <a:ext uri="{FF2B5EF4-FFF2-40B4-BE49-F238E27FC236}">
+                <a16:creationId xmlns:a16="http://schemas.microsoft.com/office/drawing/2014/main" id="{5098FA82-4CC0-4CE2-9B98-C74729F2214D}"/>
+              </a:ext>
+            </a:extLst>
+          </p:cNvPr>
+          <p:cNvPicPr>
+            <a:picLocks noChangeAspect="1" noChangeArrowheads="1"/>
+          </p:cNvPicPr>
+          <p:nvPr/>
+        </p:nvPicPr>
+        <p:blipFill>
+          <a:blip r:embed="rId2">
+            <a:extLst>
+              <a:ext uri="{28A0092B-C50C-407E-A947-70E740481C1C}">
+                <a14:useLocalDpi xmlns:a14="http://schemas.microsoft.com/office/drawing/2010/main" val="0"/>
+              </a:ext>
+            </a:extLst>
+          </a:blip>
+          <a:srcRect/>
+          <a:stretch>
+            <a:fillRect/>
+          </a:stretch>
+        </p:blipFill>
+        <p:spPr bwMode="auto">
+          <a:xfrm>
+            <a:off x="1216555" y="643467"/>
+            <a:ext cx="9758890" cy="5050225"/>
+          </a:xfrm>
+          <a:prstGeom prst="rect">
+            <a:avLst/>
+          </a:prstGeom>
+          <a:noFill/>
+          <a:extLst>
+            <a:ext uri="{909E8E84-426E-40DD-AFC4-6F175D3DCCD1}">
+              <a14:hiddenFill xmlns:a14="http://schemas.microsoft.com/office/drawing/2010/main">
+                <a:solidFill>
+                  <a:srgbClr val="FFFFFF"/>
+                </a:solidFill>
+              </a14:hiddenFill>
+            </a:ext>
+          </a:extLst>
+        </p:spPr>
+      </p:pic>
+      <p:sp>
+        <p:nvSpPr>
+          <p:cNvPr id="2" name="Footer Placeholder 1">
+            <a:extLst>
+              <a:ext uri="{FF2B5EF4-FFF2-40B4-BE49-F238E27FC236}">
+                <a16:creationId xmlns:a16="http://schemas.microsoft.com/office/drawing/2014/main" id="{60E2606A-32B8-4AF2-B377-6FE8BDE04818}"/>
+              </a:ext>
+            </a:extLst>
+          </p:cNvPr>
+          <p:cNvSpPr>
+            <a:spLocks noGrp="1"/>
+          </p:cNvSpPr>
+          <p:nvPr>
+            <p:ph type="ftr" sz="quarter" idx="11"/>
+          </p:nvPr>
+        </p:nvSpPr>
+        <p:spPr>
+          <a:xfrm>
+            <a:off x="3686185" y="6459785"/>
+            <a:ext cx="4822804" cy="365125"/>
+          </a:xfrm>
+        </p:spPr>
+        <p:txBody>
+          <a:bodyPr>
+            <a:normAutofit/>
+          </a:bodyPr>
+          <a:lstStyle/>
+          <a:p>
+            <a:pPr>
+              <a:spcAft>
+                <a:spcPts val="600"/>
+              </a:spcAft>
+            </a:pPr>
+            <a:r>
+              <a:rPr lang="en-US"/>
+              <a:t>Add a footer</a:t>
+            </a:r>
+          </a:p>
+        </p:txBody>
+      </p:sp>
+    </p:spTree>
+    <p:extLst>
+      <p:ext uri="{BB962C8B-B14F-4D97-AF65-F5344CB8AC3E}">
+        <p14:creationId xmlns:p14="http://schemas.microsoft.com/office/powerpoint/2010/main" val="785522147"/>
+      </p:ext>
+    </p:extLst>
+  </p:cSld>
+  <p:clrMapOvr>
+    <a:masterClrMapping/>
+  </p:clrMapOvr>
+  <mc:AlternateContent xmlns:mc="http://schemas.openxmlformats.org/markup-compatibility/2006" xmlns:p14="http://schemas.microsoft.com/office/powerpoint/2010/main">
+    <mc:Choice Requires="p14">
+      <p:transition spd="med" p14:dur="700">
+        <p:fade/>
+      </p:transition>
+    </mc:Choice>
+    <mc:Fallback xmlns="">
+      <p:transition spd="med">
+        <p:fade/>
+      </p:transition>
+    </mc:Fallback>
+  </mc:AlternateContent>
+</p:sld>
+</file>
+
 <file path=ppt/slides/slide2.xml><?xml version="1.0" encoding="utf-8"?>
 <p:sld xmlns:a="http://schemas.openxmlformats.org/drawingml/2006/main" xmlns:r="http://schemas.openxmlformats.org/officeDocument/2006/relationships" xmlns:p="http://schemas.openxmlformats.org/presentationml/2006/main">
   <p:cSld>
@@ -4939,129 +6325,7 @@
 </p:sld>
 </file>
 
-<file path=ppt/slides/slide3.xml><?xml version="1.0" encoding="utf-8"?>
-<p:sld xmlns:a="http://schemas.openxmlformats.org/drawingml/2006/main" xmlns:r="http://schemas.openxmlformats.org/officeDocument/2006/relationships" xmlns:p="http://schemas.openxmlformats.org/presentationml/2006/main">
-  <p:cSld>
-    <p:spTree>
-      <p:nvGrpSpPr>
-        <p:cNvPr id="1" name=""/>
-        <p:cNvGrpSpPr/>
-        <p:nvPr/>
-      </p:nvGrpSpPr>
-      <p:grpSpPr>
-        <a:xfrm>
-          <a:off x="0" y="0"/>
-          <a:ext cx="0" cy="0"/>
-          <a:chOff x="0" y="0"/>
-          <a:chExt cx="0" cy="0"/>
-        </a:xfrm>
-      </p:grpSpPr>
-      <p:sp>
-        <p:nvSpPr>
-          <p:cNvPr id="2" name="Title 1"/>
-          <p:cNvSpPr>
-            <a:spLocks noGrp="1"/>
-          </p:cNvSpPr>
-          <p:nvPr>
-            <p:ph type="title"/>
-          </p:nvPr>
-        </p:nvSpPr>
-        <p:spPr/>
-        <p:txBody>
-          <a:bodyPr/>
-          <a:lstStyle/>
-          <a:p>
-            <a:r>
-              <a:rPr lang="en-US" dirty="0"/>
-              <a:t>Google classroom code</a:t>
-            </a:r>
-          </a:p>
-        </p:txBody>
-      </p:sp>
-      <p:sp>
-        <p:nvSpPr>
-          <p:cNvPr id="3" name="Content Placeholder 2"/>
-          <p:cNvSpPr>
-            <a:spLocks noGrp="1"/>
-          </p:cNvSpPr>
-          <p:nvPr>
-            <p:ph idx="1"/>
-          </p:nvPr>
-        </p:nvSpPr>
-        <p:spPr/>
-        <p:txBody>
-          <a:bodyPr>
-            <a:normAutofit/>
-          </a:bodyPr>
-          <a:lstStyle/>
-          <a:p>
-            <a:pPr marL="0" indent="0" algn="ctr">
-              <a:buNone/>
-            </a:pPr>
-            <a:r>
-              <a:rPr lang="en-US" sz="19900" dirty="0"/>
-              <a:t>1c62ger</a:t>
-            </a:r>
-            <a:endParaRPr lang="en-US" sz="400000" b="1" dirty="0">
-              <a:cs typeface="Arial" pitchFamily="34" charset="0"/>
-            </a:endParaRPr>
-          </a:p>
-        </p:txBody>
-      </p:sp>
-      <p:sp>
-        <p:nvSpPr>
-          <p:cNvPr id="4" name="Footer Placeholder 3">
-            <a:extLst>
-              <a:ext uri="{FF2B5EF4-FFF2-40B4-BE49-F238E27FC236}">
-                <a16:creationId xmlns:a16="http://schemas.microsoft.com/office/drawing/2014/main" id="{EADFB87E-2A3F-4815-8F5E-3CF3521EBF24}"/>
-              </a:ext>
-            </a:extLst>
-          </p:cNvPr>
-          <p:cNvSpPr>
-            <a:spLocks noGrp="1"/>
-          </p:cNvSpPr>
-          <p:nvPr>
-            <p:ph type="ftr" sz="quarter" idx="11"/>
-          </p:nvPr>
-        </p:nvSpPr>
-        <p:spPr/>
-        <p:txBody>
-          <a:bodyPr/>
-          <a:lstStyle/>
-          <a:p>
-            <a:r>
-              <a:rPr lang="en-US" dirty="0"/>
-              <a:t>Unit 1 – Section 1 - Day 1</a:t>
-            </a:r>
-          </a:p>
-        </p:txBody>
-      </p:sp>
-    </p:spTree>
-    <p:extLst>
-      <p:ext uri="{BB962C8B-B14F-4D97-AF65-F5344CB8AC3E}">
-        <p14:creationId xmlns:p14="http://schemas.microsoft.com/office/powerpoint/2010/main" val="1645033752"/>
-      </p:ext>
-    </p:extLst>
-  </p:cSld>
-  <p:clrMapOvr>
-    <a:masterClrMapping/>
-  </p:clrMapOvr>
-  <mc:AlternateContent xmlns:mc="http://schemas.openxmlformats.org/markup-compatibility/2006" xmlns:p14="http://schemas.microsoft.com/office/powerpoint/2010/main">
-    <mc:Choice Requires="p14">
-      <p:transition spd="med" p14:dur="700">
-        <p:fade/>
-      </p:transition>
-    </mc:Choice>
-    <mc:Fallback xmlns="">
-      <p:transition spd="med">
-        <p:fade/>
-      </p:transition>
-    </mc:Fallback>
-  </mc:AlternateContent>
-</p:sld>
-</file>
-
-<file path=ppt/slides/slide4.xml><?xml version="1.0" encoding="utf-8"?>
+<file path=ppt/slides/slide20.xml><?xml version="1.0" encoding="utf-8"?>
 <p:sld xmlns:a="http://schemas.openxmlformats.org/drawingml/2006/main" xmlns:r="http://schemas.openxmlformats.org/officeDocument/2006/relationships" xmlns:p="http://schemas.openxmlformats.org/presentationml/2006/main">
   <p:cSld>
     <p:spTree>
@@ -5217,7 +6481,7 @@
 </p:sld>
 </file>
 
-<file path=ppt/slides/slide5.xml><?xml version="1.0" encoding="utf-8"?>
+<file path=ppt/slides/slide21.xml><?xml version="1.0" encoding="utf-8"?>
 <p:sld xmlns:a="http://schemas.openxmlformats.org/drawingml/2006/main" xmlns:r="http://schemas.openxmlformats.org/officeDocument/2006/relationships" xmlns:p="http://schemas.openxmlformats.org/presentationml/2006/main">
   <p:cSld>
     <p:spTree>
@@ -5382,7 +6646,7 @@
 </p:sld>
 </file>
 
-<file path=ppt/slides/slide6.xml><?xml version="1.0" encoding="utf-8"?>
+<file path=ppt/slides/slide22.xml><?xml version="1.0" encoding="utf-8"?>
 <p:sld xmlns:a="http://schemas.openxmlformats.org/drawingml/2006/main" xmlns:r="http://schemas.openxmlformats.org/officeDocument/2006/relationships" xmlns:p="http://schemas.openxmlformats.org/presentationml/2006/main">
   <p:cSld>
     <p:spTree>
@@ -5570,7 +6834,7 @@
 </p:sld>
 </file>
 
-<file path=ppt/slides/slide7.xml><?xml version="1.0" encoding="utf-8"?>
+<file path=ppt/slides/slide23.xml><?xml version="1.0" encoding="utf-8"?>
 <p:sld xmlns:a="http://schemas.openxmlformats.org/drawingml/2006/main" xmlns:r="http://schemas.openxmlformats.org/officeDocument/2006/relationships" xmlns:p="http://schemas.openxmlformats.org/presentationml/2006/main">
   <p:cSld>
     <p:spTree>
@@ -5783,7 +7047,7 @@
 </p:sld>
 </file>
 
-<file path=ppt/slides/slide8.xml><?xml version="1.0" encoding="utf-8"?>
+<file path=ppt/slides/slide24.xml><?xml version="1.0" encoding="utf-8"?>
 <p:sld xmlns:a="http://schemas.openxmlformats.org/drawingml/2006/main" xmlns:r="http://schemas.openxmlformats.org/officeDocument/2006/relationships" xmlns:p="http://schemas.openxmlformats.org/presentationml/2006/main">
   <p:cSld>
     <p:bg>
@@ -6017,6 +7281,998 @@
     <p:extLst>
       <p:ext uri="{BB962C8B-B14F-4D97-AF65-F5344CB8AC3E}">
         <p14:creationId xmlns:p14="http://schemas.microsoft.com/office/powerpoint/2010/main" val="3340891624"/>
+      </p:ext>
+    </p:extLst>
+  </p:cSld>
+  <p:clrMapOvr>
+    <a:masterClrMapping/>
+  </p:clrMapOvr>
+  <mc:AlternateContent xmlns:mc="http://schemas.openxmlformats.org/markup-compatibility/2006" xmlns:p14="http://schemas.microsoft.com/office/powerpoint/2010/main">
+    <mc:Choice Requires="p14">
+      <p:transition spd="med" p14:dur="700">
+        <p:fade/>
+      </p:transition>
+    </mc:Choice>
+    <mc:Fallback xmlns="">
+      <p:transition spd="med">
+        <p:fade/>
+      </p:transition>
+    </mc:Fallback>
+  </mc:AlternateContent>
+</p:sld>
+</file>
+
+<file path=ppt/slides/slide3.xml><?xml version="1.0" encoding="utf-8"?>
+<p:sld xmlns:a="http://schemas.openxmlformats.org/drawingml/2006/main" xmlns:r="http://schemas.openxmlformats.org/officeDocument/2006/relationships" xmlns:p="http://schemas.openxmlformats.org/presentationml/2006/main">
+  <p:cSld>
+    <p:spTree>
+      <p:nvGrpSpPr>
+        <p:cNvPr id="1" name=""/>
+        <p:cNvGrpSpPr/>
+        <p:nvPr/>
+      </p:nvGrpSpPr>
+      <p:grpSpPr>
+        <a:xfrm>
+          <a:off x="0" y="0"/>
+          <a:ext cx="0" cy="0"/>
+          <a:chOff x="0" y="0"/>
+          <a:chExt cx="0" cy="0"/>
+        </a:xfrm>
+      </p:grpSpPr>
+      <p:sp>
+        <p:nvSpPr>
+          <p:cNvPr id="2" name="Title 1"/>
+          <p:cNvSpPr>
+            <a:spLocks noGrp="1"/>
+          </p:cNvSpPr>
+          <p:nvPr>
+            <p:ph type="title"/>
+          </p:nvPr>
+        </p:nvSpPr>
+        <p:spPr/>
+        <p:txBody>
+          <a:bodyPr/>
+          <a:lstStyle/>
+          <a:p>
+            <a:r>
+              <a:rPr lang="en-US" dirty="0"/>
+              <a:t>Google classroom code</a:t>
+            </a:r>
+          </a:p>
+        </p:txBody>
+      </p:sp>
+      <p:sp>
+        <p:nvSpPr>
+          <p:cNvPr id="3" name="Content Placeholder 2"/>
+          <p:cNvSpPr>
+            <a:spLocks noGrp="1"/>
+          </p:cNvSpPr>
+          <p:nvPr>
+            <p:ph idx="1"/>
+          </p:nvPr>
+        </p:nvSpPr>
+        <p:spPr/>
+        <p:txBody>
+          <a:bodyPr>
+            <a:normAutofit/>
+          </a:bodyPr>
+          <a:lstStyle/>
+          <a:p>
+            <a:pPr marL="0" indent="0" algn="ctr">
+              <a:buNone/>
+            </a:pPr>
+            <a:r>
+              <a:rPr lang="en-US" sz="19900" dirty="0"/>
+              <a:t>1c62ger</a:t>
+            </a:r>
+            <a:endParaRPr lang="en-US" sz="400000" b="1" dirty="0">
+              <a:cs typeface="Arial" pitchFamily="34" charset="0"/>
+            </a:endParaRPr>
+          </a:p>
+        </p:txBody>
+      </p:sp>
+      <p:sp>
+        <p:nvSpPr>
+          <p:cNvPr id="4" name="Footer Placeholder 3">
+            <a:extLst>
+              <a:ext uri="{FF2B5EF4-FFF2-40B4-BE49-F238E27FC236}">
+                <a16:creationId xmlns:a16="http://schemas.microsoft.com/office/drawing/2014/main" id="{EADFB87E-2A3F-4815-8F5E-3CF3521EBF24}"/>
+              </a:ext>
+            </a:extLst>
+          </p:cNvPr>
+          <p:cNvSpPr>
+            <a:spLocks noGrp="1"/>
+          </p:cNvSpPr>
+          <p:nvPr>
+            <p:ph type="ftr" sz="quarter" idx="11"/>
+          </p:nvPr>
+        </p:nvSpPr>
+        <p:spPr/>
+        <p:txBody>
+          <a:bodyPr/>
+          <a:lstStyle/>
+          <a:p>
+            <a:r>
+              <a:rPr lang="en-US" dirty="0"/>
+              <a:t>Unit 1 – Section 1 - Day 1</a:t>
+            </a:r>
+          </a:p>
+        </p:txBody>
+      </p:sp>
+    </p:spTree>
+    <p:extLst>
+      <p:ext uri="{BB962C8B-B14F-4D97-AF65-F5344CB8AC3E}">
+        <p14:creationId xmlns:p14="http://schemas.microsoft.com/office/powerpoint/2010/main" val="1645033752"/>
+      </p:ext>
+    </p:extLst>
+  </p:cSld>
+  <p:clrMapOvr>
+    <a:masterClrMapping/>
+  </p:clrMapOvr>
+  <mc:AlternateContent xmlns:mc="http://schemas.openxmlformats.org/markup-compatibility/2006" xmlns:p14="http://schemas.microsoft.com/office/powerpoint/2010/main">
+    <mc:Choice Requires="p14">
+      <p:transition spd="med" p14:dur="700">
+        <p:fade/>
+      </p:transition>
+    </mc:Choice>
+    <mc:Fallback xmlns="">
+      <p:transition spd="med">
+        <p:fade/>
+      </p:transition>
+    </mc:Fallback>
+  </mc:AlternateContent>
+</p:sld>
+</file>
+
+<file path=ppt/slides/slide4.xml><?xml version="1.0" encoding="utf-8"?>
+<p:sld xmlns:a="http://schemas.openxmlformats.org/drawingml/2006/main" xmlns:r="http://schemas.openxmlformats.org/officeDocument/2006/relationships" xmlns:p="http://schemas.openxmlformats.org/presentationml/2006/main">
+  <p:cSld>
+    <p:spTree>
+      <p:nvGrpSpPr>
+        <p:cNvPr id="1" name=""/>
+        <p:cNvGrpSpPr/>
+        <p:nvPr/>
+      </p:nvGrpSpPr>
+      <p:grpSpPr>
+        <a:xfrm>
+          <a:off x="0" y="0"/>
+          <a:ext cx="0" cy="0"/>
+          <a:chOff x="0" y="0"/>
+          <a:chExt cx="0" cy="0"/>
+        </a:xfrm>
+      </p:grpSpPr>
+      <p:sp>
+        <p:nvSpPr>
+          <p:cNvPr id="2" name="Title 1">
+            <a:extLst>
+              <a:ext uri="{FF2B5EF4-FFF2-40B4-BE49-F238E27FC236}">
+                <a16:creationId xmlns:a16="http://schemas.microsoft.com/office/drawing/2014/main" id="{67511153-4950-492F-B5CE-E46AE46836EF}"/>
+              </a:ext>
+            </a:extLst>
+          </p:cNvPr>
+          <p:cNvSpPr>
+            <a:spLocks noGrp="1"/>
+          </p:cNvSpPr>
+          <p:nvPr>
+            <p:ph type="title"/>
+          </p:nvPr>
+        </p:nvSpPr>
+        <p:spPr/>
+        <p:txBody>
+          <a:bodyPr/>
+          <a:lstStyle/>
+          <a:p>
+            <a:r>
+              <a:rPr lang="en-US" dirty="0"/>
+              <a:t>QUIZ REVIEW</a:t>
+            </a:r>
+          </a:p>
+        </p:txBody>
+      </p:sp>
+      <p:sp>
+        <p:nvSpPr>
+          <p:cNvPr id="3" name="Content Placeholder 2">
+            <a:extLst>
+              <a:ext uri="{FF2B5EF4-FFF2-40B4-BE49-F238E27FC236}">
+                <a16:creationId xmlns:a16="http://schemas.microsoft.com/office/drawing/2014/main" id="{3B33FE1F-31D5-4F9E-B00D-C34DDFCF1D05}"/>
+              </a:ext>
+            </a:extLst>
+          </p:cNvPr>
+          <p:cNvSpPr>
+            <a:spLocks noGrp="1"/>
+          </p:cNvSpPr>
+          <p:nvPr>
+            <p:ph idx="1"/>
+          </p:nvPr>
+        </p:nvSpPr>
+        <p:spPr/>
+        <p:txBody>
+          <a:bodyPr/>
+          <a:lstStyle/>
+          <a:p>
+            <a:pPr>
+              <a:buFont typeface="Wingdings" panose="05000000000000000000" pitchFamily="2" charset="2"/>
+              <a:buChar char="§"/>
+            </a:pPr>
+            <a:r>
+              <a:rPr lang="en-US" dirty="0"/>
+              <a:t> Average grade was a 138.33 out of 150 </a:t>
+            </a:r>
+          </a:p>
+          <a:p>
+            <a:pPr lvl="1">
+              <a:buFont typeface="Wingdings" panose="05000000000000000000" pitchFamily="2" charset="2"/>
+              <a:buChar char="§"/>
+            </a:pPr>
+            <a:r>
+              <a:rPr lang="en-US" dirty="0"/>
+              <a:t>92.2 %</a:t>
+            </a:r>
+          </a:p>
+          <a:p>
+            <a:pPr lvl="1">
+              <a:buFont typeface="Wingdings" panose="05000000000000000000" pitchFamily="2" charset="2"/>
+              <a:buChar char="§"/>
+            </a:pPr>
+            <a:r>
+              <a:rPr lang="en-US" dirty="0"/>
+              <a:t>Great job class!</a:t>
+            </a:r>
+          </a:p>
+          <a:p>
+            <a:pPr>
+              <a:buFont typeface="Wingdings" panose="05000000000000000000" pitchFamily="2" charset="2"/>
+              <a:buChar char="§"/>
+            </a:pPr>
+            <a:r>
+              <a:rPr lang="en-US" dirty="0"/>
+              <a:t>Grades ranged from 90 – 150 points</a:t>
+            </a:r>
+          </a:p>
+          <a:p>
+            <a:pPr>
+              <a:buFont typeface="Wingdings" panose="05000000000000000000" pitchFamily="2" charset="2"/>
+              <a:buChar char="§"/>
+            </a:pPr>
+            <a:r>
+              <a:rPr lang="en-US" dirty="0"/>
+              <a:t> Only 18 responses of 22</a:t>
+            </a:r>
+          </a:p>
+          <a:p>
+            <a:pPr lvl="1">
+              <a:buFont typeface="Wingdings" panose="05000000000000000000" pitchFamily="2" charset="2"/>
+              <a:buChar char="§"/>
+            </a:pPr>
+            <a:r>
+              <a:rPr lang="en-US" dirty="0"/>
+              <a:t>Be sure to not miss anymore quizzes moving forward</a:t>
+            </a:r>
+          </a:p>
+        </p:txBody>
+      </p:sp>
+      <p:sp>
+        <p:nvSpPr>
+          <p:cNvPr id="4" name="Footer Placeholder 3">
+            <a:extLst>
+              <a:ext uri="{FF2B5EF4-FFF2-40B4-BE49-F238E27FC236}">
+                <a16:creationId xmlns:a16="http://schemas.microsoft.com/office/drawing/2014/main" id="{BAAA3E38-A865-416D-8EAA-173FE7C8195B}"/>
+              </a:ext>
+            </a:extLst>
+          </p:cNvPr>
+          <p:cNvSpPr>
+            <a:spLocks noGrp="1"/>
+          </p:cNvSpPr>
+          <p:nvPr>
+            <p:ph type="ftr" sz="quarter" idx="11"/>
+          </p:nvPr>
+        </p:nvSpPr>
+        <p:spPr/>
+        <p:txBody>
+          <a:bodyPr/>
+          <a:lstStyle/>
+          <a:p>
+            <a:r>
+              <a:rPr lang="en-US"/>
+              <a:t>Add a footer</a:t>
+            </a:r>
+            <a:endParaRPr lang="en-US" dirty="0"/>
+          </a:p>
+        </p:txBody>
+      </p:sp>
+    </p:spTree>
+    <p:extLst>
+      <p:ext uri="{BB962C8B-B14F-4D97-AF65-F5344CB8AC3E}">
+        <p14:creationId xmlns:p14="http://schemas.microsoft.com/office/powerpoint/2010/main" val="4275186485"/>
+      </p:ext>
+    </p:extLst>
+  </p:cSld>
+  <p:clrMapOvr>
+    <a:masterClrMapping/>
+  </p:clrMapOvr>
+  <mc:AlternateContent xmlns:mc="http://schemas.openxmlformats.org/markup-compatibility/2006" xmlns:p14="http://schemas.microsoft.com/office/powerpoint/2010/main">
+    <mc:Choice Requires="p14">
+      <p:transition spd="med" p14:dur="700">
+        <p:fade/>
+      </p:transition>
+    </mc:Choice>
+    <mc:Fallback xmlns="">
+      <p:transition spd="med">
+        <p:fade/>
+      </p:transition>
+    </mc:Fallback>
+  </mc:AlternateContent>
+</p:sld>
+</file>
+
+<file path=ppt/slides/slide5.xml><?xml version="1.0" encoding="utf-8"?>
+<p:sld xmlns:a="http://schemas.openxmlformats.org/drawingml/2006/main" xmlns:r="http://schemas.openxmlformats.org/officeDocument/2006/relationships" xmlns:p="http://schemas.openxmlformats.org/presentationml/2006/main">
+  <p:cSld>
+    <p:bg>
+      <p:bgPr>
+        <a:solidFill>
+          <a:schemeClr val="bg1"/>
+        </a:solidFill>
+        <a:effectLst/>
+      </p:bgPr>
+    </p:bg>
+    <p:spTree>
+      <p:nvGrpSpPr>
+        <p:cNvPr id="1" name=""/>
+        <p:cNvGrpSpPr/>
+        <p:nvPr/>
+      </p:nvGrpSpPr>
+      <p:grpSpPr>
+        <a:xfrm>
+          <a:off x="0" y="0"/>
+          <a:ext cx="0" cy="0"/>
+          <a:chOff x="0" y="0"/>
+          <a:chExt cx="0" cy="0"/>
+        </a:xfrm>
+      </p:grpSpPr>
+      <p:pic>
+        <p:nvPicPr>
+          <p:cNvPr id="1028" name="Picture 4" descr="Forms response chart. Question title: A basic complete circuit has four (4) parts. Select those four (4) parts from the options below:. Number of responses: 16 / 18 correct responses.">
+            <a:extLst>
+              <a:ext uri="{FF2B5EF4-FFF2-40B4-BE49-F238E27FC236}">
+                <a16:creationId xmlns:a16="http://schemas.microsoft.com/office/drawing/2014/main" id="{A6F74F5E-177E-45A9-B297-0AD76ED3B3DC}"/>
+              </a:ext>
+            </a:extLst>
+          </p:cNvPr>
+          <p:cNvPicPr>
+            <a:picLocks noChangeAspect="1" noChangeArrowheads="1"/>
+          </p:cNvPicPr>
+          <p:nvPr/>
+        </p:nvPicPr>
+        <p:blipFill>
+          <a:blip r:embed="rId2">
+            <a:extLst>
+              <a:ext uri="{28A0092B-C50C-407E-A947-70E740481C1C}">
+                <a14:useLocalDpi xmlns:a14="http://schemas.microsoft.com/office/drawing/2010/main" val="0"/>
+              </a:ext>
+            </a:extLst>
+          </a:blip>
+          <a:srcRect/>
+          <a:stretch>
+            <a:fillRect/>
+          </a:stretch>
+        </p:blipFill>
+        <p:spPr bwMode="auto">
+          <a:xfrm>
+            <a:off x="1566649" y="643467"/>
+            <a:ext cx="9058702" cy="5050225"/>
+          </a:xfrm>
+          <a:prstGeom prst="rect">
+            <a:avLst/>
+          </a:prstGeom>
+          <a:noFill/>
+          <a:extLst>
+            <a:ext uri="{909E8E84-426E-40DD-AFC4-6F175D3DCCD1}">
+              <a14:hiddenFill xmlns:a14="http://schemas.microsoft.com/office/drawing/2010/main">
+                <a:solidFill>
+                  <a:srgbClr val="FFFFFF"/>
+                </a:solidFill>
+              </a14:hiddenFill>
+            </a:ext>
+          </a:extLst>
+        </p:spPr>
+      </p:pic>
+      <p:sp>
+        <p:nvSpPr>
+          <p:cNvPr id="4" name="Footer Placeholder 3">
+            <a:extLst>
+              <a:ext uri="{FF2B5EF4-FFF2-40B4-BE49-F238E27FC236}">
+                <a16:creationId xmlns:a16="http://schemas.microsoft.com/office/drawing/2014/main" id="{714AB0CD-5495-48DA-AD80-315990F916CD}"/>
+              </a:ext>
+            </a:extLst>
+          </p:cNvPr>
+          <p:cNvSpPr>
+            <a:spLocks noGrp="1"/>
+          </p:cNvSpPr>
+          <p:nvPr>
+            <p:ph type="ftr" sz="quarter" idx="11"/>
+          </p:nvPr>
+        </p:nvSpPr>
+        <p:spPr>
+          <a:xfrm>
+            <a:off x="3686185" y="6459785"/>
+            <a:ext cx="4822804" cy="365125"/>
+          </a:xfrm>
+        </p:spPr>
+        <p:txBody>
+          <a:bodyPr vert="horz" lIns="91440" tIns="45720" rIns="91440" bIns="45720" rtlCol="0">
+            <a:normAutofit/>
+          </a:bodyPr>
+          <a:lstStyle/>
+          <a:p>
+            <a:pPr defTabSz="914400">
+              <a:spcAft>
+                <a:spcPts val="600"/>
+              </a:spcAft>
+            </a:pPr>
+            <a:r>
+              <a:rPr lang="en-US" kern="1200" cap="all" baseline="0">
+                <a:latin typeface="+mn-lt"/>
+                <a:ea typeface="+mn-ea"/>
+                <a:cs typeface="+mn-cs"/>
+              </a:rPr>
+              <a:t>Add a footer</a:t>
+            </a:r>
+          </a:p>
+        </p:txBody>
+      </p:sp>
+    </p:spTree>
+    <p:extLst>
+      <p:ext uri="{BB962C8B-B14F-4D97-AF65-F5344CB8AC3E}">
+        <p14:creationId xmlns:p14="http://schemas.microsoft.com/office/powerpoint/2010/main" val="2794100856"/>
+      </p:ext>
+    </p:extLst>
+  </p:cSld>
+  <p:clrMapOvr>
+    <a:masterClrMapping/>
+  </p:clrMapOvr>
+  <mc:AlternateContent xmlns:mc="http://schemas.openxmlformats.org/markup-compatibility/2006" xmlns:p14="http://schemas.microsoft.com/office/powerpoint/2010/main">
+    <mc:Choice Requires="p14">
+      <p:transition spd="med" p14:dur="700">
+        <p:fade/>
+      </p:transition>
+    </mc:Choice>
+    <mc:Fallback xmlns="">
+      <p:transition spd="med">
+        <p:fade/>
+      </p:transition>
+    </mc:Fallback>
+  </mc:AlternateContent>
+</p:sld>
+</file>
+
+<file path=ppt/slides/slide6.xml><?xml version="1.0" encoding="utf-8"?>
+<p:sld xmlns:a="http://schemas.openxmlformats.org/drawingml/2006/main" xmlns:r="http://schemas.openxmlformats.org/officeDocument/2006/relationships" xmlns:p="http://schemas.openxmlformats.org/presentationml/2006/main">
+  <p:cSld>
+    <p:bg>
+      <p:bgPr>
+        <a:solidFill>
+          <a:schemeClr val="bg1"/>
+        </a:solidFill>
+        <a:effectLst/>
+      </p:bgPr>
+    </p:bg>
+    <p:spTree>
+      <p:nvGrpSpPr>
+        <p:cNvPr id="1" name=""/>
+        <p:cNvGrpSpPr/>
+        <p:nvPr/>
+      </p:nvGrpSpPr>
+      <p:grpSpPr>
+        <a:xfrm>
+          <a:off x="0" y="0"/>
+          <a:ext cx="0" cy="0"/>
+          <a:chOff x="0" y="0"/>
+          <a:chExt cx="0" cy="0"/>
+        </a:xfrm>
+      </p:grpSpPr>
+      <p:pic>
+        <p:nvPicPr>
+          <p:cNvPr id="2050" name="Picture 2" descr="Forms response chart. Question title: What moves through the electrical path creating electricity?. Number of responses: 16 / 18 correct responses.">
+            <a:extLst>
+              <a:ext uri="{FF2B5EF4-FFF2-40B4-BE49-F238E27FC236}">
+                <a16:creationId xmlns:a16="http://schemas.microsoft.com/office/drawing/2014/main" id="{7351E75A-7E84-452F-936C-495FB2CD9A23}"/>
+              </a:ext>
+            </a:extLst>
+          </p:cNvPr>
+          <p:cNvPicPr>
+            <a:picLocks noChangeAspect="1" noChangeArrowheads="1"/>
+          </p:cNvPicPr>
+          <p:nvPr/>
+        </p:nvPicPr>
+        <p:blipFill>
+          <a:blip r:embed="rId2">
+            <a:extLst>
+              <a:ext uri="{28A0092B-C50C-407E-A947-70E740481C1C}">
+                <a14:useLocalDpi xmlns:a14="http://schemas.microsoft.com/office/drawing/2010/main" val="0"/>
+              </a:ext>
+            </a:extLst>
+          </a:blip>
+          <a:srcRect/>
+          <a:stretch>
+            <a:fillRect/>
+          </a:stretch>
+        </p:blipFill>
+        <p:spPr bwMode="auto">
+          <a:xfrm>
+            <a:off x="1216555" y="643467"/>
+            <a:ext cx="9758890" cy="5050225"/>
+          </a:xfrm>
+          <a:prstGeom prst="rect">
+            <a:avLst/>
+          </a:prstGeom>
+          <a:noFill/>
+          <a:extLst>
+            <a:ext uri="{909E8E84-426E-40DD-AFC4-6F175D3DCCD1}">
+              <a14:hiddenFill xmlns:a14="http://schemas.microsoft.com/office/drawing/2010/main">
+                <a:solidFill>
+                  <a:srgbClr val="FFFFFF"/>
+                </a:solidFill>
+              </a14:hiddenFill>
+            </a:ext>
+          </a:extLst>
+        </p:spPr>
+      </p:pic>
+      <p:sp>
+        <p:nvSpPr>
+          <p:cNvPr id="2" name="Footer Placeholder 1">
+            <a:extLst>
+              <a:ext uri="{FF2B5EF4-FFF2-40B4-BE49-F238E27FC236}">
+                <a16:creationId xmlns:a16="http://schemas.microsoft.com/office/drawing/2014/main" id="{4941B51D-72EA-4FC7-992A-0E0C923512FF}"/>
+              </a:ext>
+            </a:extLst>
+          </p:cNvPr>
+          <p:cNvSpPr>
+            <a:spLocks noGrp="1"/>
+          </p:cNvSpPr>
+          <p:nvPr>
+            <p:ph type="ftr" sz="quarter" idx="11"/>
+          </p:nvPr>
+        </p:nvSpPr>
+        <p:spPr>
+          <a:xfrm>
+            <a:off x="3686185" y="6459785"/>
+            <a:ext cx="4822804" cy="365125"/>
+          </a:xfrm>
+        </p:spPr>
+        <p:txBody>
+          <a:bodyPr>
+            <a:normAutofit/>
+          </a:bodyPr>
+          <a:lstStyle/>
+          <a:p>
+            <a:pPr>
+              <a:spcAft>
+                <a:spcPts val="600"/>
+              </a:spcAft>
+            </a:pPr>
+            <a:r>
+              <a:rPr lang="en-US"/>
+              <a:t>Add a footer</a:t>
+            </a:r>
+          </a:p>
+        </p:txBody>
+      </p:sp>
+    </p:spTree>
+    <p:extLst>
+      <p:ext uri="{BB962C8B-B14F-4D97-AF65-F5344CB8AC3E}">
+        <p14:creationId xmlns:p14="http://schemas.microsoft.com/office/powerpoint/2010/main" val="1250924397"/>
+      </p:ext>
+    </p:extLst>
+  </p:cSld>
+  <p:clrMapOvr>
+    <a:masterClrMapping/>
+  </p:clrMapOvr>
+  <mc:AlternateContent xmlns:mc="http://schemas.openxmlformats.org/markup-compatibility/2006" xmlns:p14="http://schemas.microsoft.com/office/powerpoint/2010/main">
+    <mc:Choice Requires="p14">
+      <p:transition spd="med" p14:dur="700">
+        <p:fade/>
+      </p:transition>
+    </mc:Choice>
+    <mc:Fallback xmlns="">
+      <p:transition spd="med">
+        <p:fade/>
+      </p:transition>
+    </mc:Fallback>
+  </mc:AlternateContent>
+</p:sld>
+</file>
+
+<file path=ppt/slides/slide7.xml><?xml version="1.0" encoding="utf-8"?>
+<p:sld xmlns:a="http://schemas.openxmlformats.org/drawingml/2006/main" xmlns:r="http://schemas.openxmlformats.org/officeDocument/2006/relationships" xmlns:p="http://schemas.openxmlformats.org/presentationml/2006/main">
+  <p:cSld>
+    <p:bg>
+      <p:bgPr>
+        <a:solidFill>
+          <a:schemeClr val="bg1"/>
+        </a:solidFill>
+        <a:effectLst/>
+      </p:bgPr>
+    </p:bg>
+    <p:spTree>
+      <p:nvGrpSpPr>
+        <p:cNvPr id="1" name=""/>
+        <p:cNvGrpSpPr/>
+        <p:nvPr/>
+      </p:nvGrpSpPr>
+      <p:grpSpPr>
+        <a:xfrm>
+          <a:off x="0" y="0"/>
+          <a:ext cx="0" cy="0"/>
+          <a:chOff x="0" y="0"/>
+          <a:chExt cx="0" cy="0"/>
+        </a:xfrm>
+      </p:grpSpPr>
+      <p:pic>
+        <p:nvPicPr>
+          <p:cNvPr id="3074" name="Picture 2" descr="Forms response chart. Question title: The force that produces electrons to move is called. Number of responses: 15 / 18 correct responses.">
+            <a:extLst>
+              <a:ext uri="{FF2B5EF4-FFF2-40B4-BE49-F238E27FC236}">
+                <a16:creationId xmlns:a16="http://schemas.microsoft.com/office/drawing/2014/main" id="{D48BD645-DA10-42FF-924C-54297491E237}"/>
+              </a:ext>
+            </a:extLst>
+          </p:cNvPr>
+          <p:cNvPicPr>
+            <a:picLocks noChangeAspect="1" noChangeArrowheads="1"/>
+          </p:cNvPicPr>
+          <p:nvPr/>
+        </p:nvPicPr>
+        <p:blipFill>
+          <a:blip r:embed="rId2">
+            <a:extLst>
+              <a:ext uri="{28A0092B-C50C-407E-A947-70E740481C1C}">
+                <a14:useLocalDpi xmlns:a14="http://schemas.microsoft.com/office/drawing/2010/main" val="0"/>
+              </a:ext>
+            </a:extLst>
+          </a:blip>
+          <a:srcRect/>
+          <a:stretch>
+            <a:fillRect/>
+          </a:stretch>
+        </p:blipFill>
+        <p:spPr bwMode="auto">
+          <a:xfrm>
+            <a:off x="1216555" y="643467"/>
+            <a:ext cx="9758890" cy="5050225"/>
+          </a:xfrm>
+          <a:prstGeom prst="rect">
+            <a:avLst/>
+          </a:prstGeom>
+          <a:noFill/>
+          <a:extLst>
+            <a:ext uri="{909E8E84-426E-40DD-AFC4-6F175D3DCCD1}">
+              <a14:hiddenFill xmlns:a14="http://schemas.microsoft.com/office/drawing/2010/main">
+                <a:solidFill>
+                  <a:srgbClr val="FFFFFF"/>
+                </a:solidFill>
+              </a14:hiddenFill>
+            </a:ext>
+          </a:extLst>
+        </p:spPr>
+      </p:pic>
+      <p:sp>
+        <p:nvSpPr>
+          <p:cNvPr id="2" name="Footer Placeholder 1">
+            <a:extLst>
+              <a:ext uri="{FF2B5EF4-FFF2-40B4-BE49-F238E27FC236}">
+                <a16:creationId xmlns:a16="http://schemas.microsoft.com/office/drawing/2014/main" id="{6D1D599D-65CB-447A-89A6-A629D023A322}"/>
+              </a:ext>
+            </a:extLst>
+          </p:cNvPr>
+          <p:cNvSpPr>
+            <a:spLocks noGrp="1"/>
+          </p:cNvSpPr>
+          <p:nvPr>
+            <p:ph type="ftr" sz="quarter" idx="11"/>
+          </p:nvPr>
+        </p:nvSpPr>
+        <p:spPr>
+          <a:xfrm>
+            <a:off x="3686185" y="6459785"/>
+            <a:ext cx="4822804" cy="365125"/>
+          </a:xfrm>
+        </p:spPr>
+        <p:txBody>
+          <a:bodyPr>
+            <a:normAutofit/>
+          </a:bodyPr>
+          <a:lstStyle/>
+          <a:p>
+            <a:pPr>
+              <a:spcAft>
+                <a:spcPts val="600"/>
+              </a:spcAft>
+            </a:pPr>
+            <a:r>
+              <a:rPr lang="en-US"/>
+              <a:t>Add a footer</a:t>
+            </a:r>
+          </a:p>
+        </p:txBody>
+      </p:sp>
+    </p:spTree>
+    <p:extLst>
+      <p:ext uri="{BB962C8B-B14F-4D97-AF65-F5344CB8AC3E}">
+        <p14:creationId xmlns:p14="http://schemas.microsoft.com/office/powerpoint/2010/main" val="2281097347"/>
+      </p:ext>
+    </p:extLst>
+  </p:cSld>
+  <p:clrMapOvr>
+    <a:masterClrMapping/>
+  </p:clrMapOvr>
+  <mc:AlternateContent xmlns:mc="http://schemas.openxmlformats.org/markup-compatibility/2006" xmlns:p14="http://schemas.microsoft.com/office/powerpoint/2010/main">
+    <mc:Choice Requires="p14">
+      <p:transition spd="med" p14:dur="700">
+        <p:fade/>
+      </p:transition>
+    </mc:Choice>
+    <mc:Fallback xmlns="">
+      <p:transition spd="med">
+        <p:fade/>
+      </p:transition>
+    </mc:Fallback>
+  </mc:AlternateContent>
+</p:sld>
+</file>
+
+<file path=ppt/slides/slide8.xml><?xml version="1.0" encoding="utf-8"?>
+<p:sld xmlns:a="http://schemas.openxmlformats.org/drawingml/2006/main" xmlns:r="http://schemas.openxmlformats.org/officeDocument/2006/relationships" xmlns:p="http://schemas.openxmlformats.org/presentationml/2006/main">
+  <p:cSld>
+    <p:bg>
+      <p:bgPr>
+        <a:solidFill>
+          <a:schemeClr val="bg1"/>
+        </a:solidFill>
+        <a:effectLst/>
+      </p:bgPr>
+    </p:bg>
+    <p:spTree>
+      <p:nvGrpSpPr>
+        <p:cNvPr id="1" name=""/>
+        <p:cNvGrpSpPr/>
+        <p:nvPr/>
+      </p:nvGrpSpPr>
+      <p:grpSpPr>
+        <a:xfrm>
+          <a:off x="0" y="0"/>
+          <a:ext cx="0" cy="0"/>
+          <a:chOff x="0" y="0"/>
+          <a:chExt cx="0" cy="0"/>
+        </a:xfrm>
+      </p:grpSpPr>
+      <p:pic>
+        <p:nvPicPr>
+          <p:cNvPr id="4098" name="Picture 2" descr="Forms response chart. Question title: The flow of electroncs from an energy source is called. Number of responses: 17 / 18 correct responses.">
+            <a:extLst>
+              <a:ext uri="{FF2B5EF4-FFF2-40B4-BE49-F238E27FC236}">
+                <a16:creationId xmlns:a16="http://schemas.microsoft.com/office/drawing/2014/main" id="{7D8E9334-453F-4028-BC56-1698BE78120C}"/>
+              </a:ext>
+            </a:extLst>
+          </p:cNvPr>
+          <p:cNvPicPr>
+            <a:picLocks noChangeAspect="1" noChangeArrowheads="1"/>
+          </p:cNvPicPr>
+          <p:nvPr/>
+        </p:nvPicPr>
+        <p:blipFill>
+          <a:blip r:embed="rId2">
+            <a:extLst>
+              <a:ext uri="{28A0092B-C50C-407E-A947-70E740481C1C}">
+                <a14:useLocalDpi xmlns:a14="http://schemas.microsoft.com/office/drawing/2010/main" val="0"/>
+              </a:ext>
+            </a:extLst>
+          </a:blip>
+          <a:srcRect/>
+          <a:stretch>
+            <a:fillRect/>
+          </a:stretch>
+        </p:blipFill>
+        <p:spPr bwMode="auto">
+          <a:xfrm>
+            <a:off x="1216555" y="643467"/>
+            <a:ext cx="9758890" cy="5050225"/>
+          </a:xfrm>
+          <a:prstGeom prst="rect">
+            <a:avLst/>
+          </a:prstGeom>
+          <a:noFill/>
+          <a:extLst>
+            <a:ext uri="{909E8E84-426E-40DD-AFC4-6F175D3DCCD1}">
+              <a14:hiddenFill xmlns:a14="http://schemas.microsoft.com/office/drawing/2010/main">
+                <a:solidFill>
+                  <a:srgbClr val="FFFFFF"/>
+                </a:solidFill>
+              </a14:hiddenFill>
+            </a:ext>
+          </a:extLst>
+        </p:spPr>
+      </p:pic>
+      <p:sp>
+        <p:nvSpPr>
+          <p:cNvPr id="2" name="Footer Placeholder 1">
+            <a:extLst>
+              <a:ext uri="{FF2B5EF4-FFF2-40B4-BE49-F238E27FC236}">
+                <a16:creationId xmlns:a16="http://schemas.microsoft.com/office/drawing/2014/main" id="{74A92CC9-3C20-4ACC-8E7F-04D33BA1CADD}"/>
+              </a:ext>
+            </a:extLst>
+          </p:cNvPr>
+          <p:cNvSpPr>
+            <a:spLocks noGrp="1"/>
+          </p:cNvSpPr>
+          <p:nvPr>
+            <p:ph type="ftr" sz="quarter" idx="11"/>
+          </p:nvPr>
+        </p:nvSpPr>
+        <p:spPr>
+          <a:xfrm>
+            <a:off x="3686185" y="6459785"/>
+            <a:ext cx="4822804" cy="365125"/>
+          </a:xfrm>
+        </p:spPr>
+        <p:txBody>
+          <a:bodyPr>
+            <a:normAutofit/>
+          </a:bodyPr>
+          <a:lstStyle/>
+          <a:p>
+            <a:pPr>
+              <a:spcAft>
+                <a:spcPts val="600"/>
+              </a:spcAft>
+            </a:pPr>
+            <a:r>
+              <a:rPr lang="en-US"/>
+              <a:t>Add a footer</a:t>
+            </a:r>
+          </a:p>
+        </p:txBody>
+      </p:sp>
+    </p:spTree>
+    <p:extLst>
+      <p:ext uri="{BB962C8B-B14F-4D97-AF65-F5344CB8AC3E}">
+        <p14:creationId xmlns:p14="http://schemas.microsoft.com/office/powerpoint/2010/main" val="2083508283"/>
+      </p:ext>
+    </p:extLst>
+  </p:cSld>
+  <p:clrMapOvr>
+    <a:masterClrMapping/>
+  </p:clrMapOvr>
+  <mc:AlternateContent xmlns:mc="http://schemas.openxmlformats.org/markup-compatibility/2006" xmlns:p14="http://schemas.microsoft.com/office/powerpoint/2010/main">
+    <mc:Choice Requires="p14">
+      <p:transition spd="med" p14:dur="700">
+        <p:fade/>
+      </p:transition>
+    </mc:Choice>
+    <mc:Fallback xmlns="">
+      <p:transition spd="med">
+        <p:fade/>
+      </p:transition>
+    </mc:Fallback>
+  </mc:AlternateContent>
+</p:sld>
+</file>
+
+<file path=ppt/slides/slide9.xml><?xml version="1.0" encoding="utf-8"?>
+<p:sld xmlns:a="http://schemas.openxmlformats.org/drawingml/2006/main" xmlns:r="http://schemas.openxmlformats.org/officeDocument/2006/relationships" xmlns:p="http://schemas.openxmlformats.org/presentationml/2006/main">
+  <p:cSld>
+    <p:bg>
+      <p:bgPr>
+        <a:solidFill>
+          <a:schemeClr val="bg1"/>
+        </a:solidFill>
+        <a:effectLst/>
+      </p:bgPr>
+    </p:bg>
+    <p:spTree>
+      <p:nvGrpSpPr>
+        <p:cNvPr id="1" name=""/>
+        <p:cNvGrpSpPr/>
+        <p:nvPr/>
+      </p:nvGrpSpPr>
+      <p:grpSpPr>
+        <a:xfrm>
+          <a:off x="0" y="0"/>
+          <a:ext cx="0" cy="0"/>
+          <a:chOff x="0" y="0"/>
+          <a:chExt cx="0" cy="0"/>
+        </a:xfrm>
+      </p:grpSpPr>
+      <p:pic>
+        <p:nvPicPr>
+          <p:cNvPr id="5122" name="Picture 2" descr="Forms response chart. Question title: A circuit that is in series allows. Number of responses: 16 / 18 correct responses.">
+            <a:extLst>
+              <a:ext uri="{FF2B5EF4-FFF2-40B4-BE49-F238E27FC236}">
+                <a16:creationId xmlns:a16="http://schemas.microsoft.com/office/drawing/2014/main" id="{49380E25-2F80-4F66-8325-AF6F230B5722}"/>
+              </a:ext>
+            </a:extLst>
+          </p:cNvPr>
+          <p:cNvPicPr>
+            <a:picLocks noChangeAspect="1" noChangeArrowheads="1"/>
+          </p:cNvPicPr>
+          <p:nvPr/>
+        </p:nvPicPr>
+        <p:blipFill>
+          <a:blip r:embed="rId2">
+            <a:extLst>
+              <a:ext uri="{28A0092B-C50C-407E-A947-70E740481C1C}">
+                <a14:useLocalDpi xmlns:a14="http://schemas.microsoft.com/office/drawing/2010/main" val="0"/>
+              </a:ext>
+            </a:extLst>
+          </a:blip>
+          <a:srcRect/>
+          <a:stretch>
+            <a:fillRect/>
+          </a:stretch>
+        </p:blipFill>
+        <p:spPr bwMode="auto">
+          <a:xfrm>
+            <a:off x="1216555" y="643467"/>
+            <a:ext cx="9758890" cy="5050225"/>
+          </a:xfrm>
+          <a:prstGeom prst="rect">
+            <a:avLst/>
+          </a:prstGeom>
+          <a:noFill/>
+          <a:extLst>
+            <a:ext uri="{909E8E84-426E-40DD-AFC4-6F175D3DCCD1}">
+              <a14:hiddenFill xmlns:a14="http://schemas.microsoft.com/office/drawing/2010/main">
+                <a:solidFill>
+                  <a:srgbClr val="FFFFFF"/>
+                </a:solidFill>
+              </a14:hiddenFill>
+            </a:ext>
+          </a:extLst>
+        </p:spPr>
+      </p:pic>
+      <p:sp>
+        <p:nvSpPr>
+          <p:cNvPr id="2" name="Footer Placeholder 1">
+            <a:extLst>
+              <a:ext uri="{FF2B5EF4-FFF2-40B4-BE49-F238E27FC236}">
+                <a16:creationId xmlns:a16="http://schemas.microsoft.com/office/drawing/2014/main" id="{076F9951-9350-432F-AFF3-25107970E428}"/>
+              </a:ext>
+            </a:extLst>
+          </p:cNvPr>
+          <p:cNvSpPr>
+            <a:spLocks noGrp="1"/>
+          </p:cNvSpPr>
+          <p:nvPr>
+            <p:ph type="ftr" sz="quarter" idx="11"/>
+          </p:nvPr>
+        </p:nvSpPr>
+        <p:spPr>
+          <a:xfrm>
+            <a:off x="3686185" y="6459785"/>
+            <a:ext cx="4822804" cy="365125"/>
+          </a:xfrm>
+        </p:spPr>
+        <p:txBody>
+          <a:bodyPr>
+            <a:normAutofit/>
+          </a:bodyPr>
+          <a:lstStyle/>
+          <a:p>
+            <a:pPr>
+              <a:spcAft>
+                <a:spcPts val="600"/>
+              </a:spcAft>
+            </a:pPr>
+            <a:r>
+              <a:rPr lang="en-US"/>
+              <a:t>Add a footer</a:t>
+            </a:r>
+          </a:p>
+        </p:txBody>
+      </p:sp>
+    </p:spTree>
+    <p:extLst>
+      <p:ext uri="{BB962C8B-B14F-4D97-AF65-F5344CB8AC3E}">
+        <p14:creationId xmlns:p14="http://schemas.microsoft.com/office/powerpoint/2010/main" val="2457994933"/>
       </p:ext>
     </p:extLst>
   </p:cSld>

</xml_diff>

<commit_message>
Ohms Law Practice Worksheet
</commit_message>
<xml_diff>
--- a/High School/Modern Electricity and Electronics/Unit 3 - Ohm's Law/Section 1 - Ohms Law/Assets/Unit 3 - Section 1 - Ohms Law.pptx
+++ b/High School/Modern Electricity and Electronics/Unit 3 - Ohm's Law/Section 1 - Ohms Law/Assets/Unit 3 - Section 1 - Ohms Law.pptx
@@ -5,10 +5,10 @@
     <p:sldMasterId id="2147483705" r:id="rId1"/>
   </p:sldMasterIdLst>
   <p:notesMasterIdLst>
-    <p:notesMasterId r:id="rId26"/>
+    <p:notesMasterId r:id="rId30"/>
   </p:notesMasterIdLst>
   <p:handoutMasterIdLst>
-    <p:handoutMasterId r:id="rId27"/>
+    <p:handoutMasterId r:id="rId31"/>
   </p:handoutMasterIdLst>
   <p:sldIdLst>
     <p:sldId id="268" r:id="rId2"/>
@@ -35,6 +35,10 @@
     <p:sldId id="274" r:id="rId23"/>
     <p:sldId id="278" r:id="rId24"/>
     <p:sldId id="279" r:id="rId25"/>
+    <p:sldId id="296" r:id="rId26"/>
+    <p:sldId id="297" r:id="rId27"/>
+    <p:sldId id="298" r:id="rId28"/>
+    <p:sldId id="299" r:id="rId29"/>
   </p:sldIdLst>
   <p:sldSz cx="12192000" cy="6858000"/>
   <p:notesSz cx="6858000" cy="9144000"/>
@@ -237,7 +241,7 @@
           <a:p>
             <a:fld id="{6AC4FB8F-ED15-48AB-97BD-17129D4E699D}" type="datetimeFigureOut">
               <a:rPr lang="en-US" smtClean="0"/>
-              <a:t>10/15/2018</a:t>
+              <a:t>10/16/2018</a:t>
             </a:fld>
             <a:endParaRPr lang="en-US" dirty="0"/>
           </a:p>
@@ -402,7 +406,7 @@
           <a:p>
             <a:fld id="{BBC9D437-CD83-4825-AD0D-5E7B341BC79B}" type="datetimeFigureOut">
               <a:rPr lang="en-US" smtClean="0"/>
-              <a:t>10/15/2018</a:t>
+              <a:t>10/16/2018</a:t>
             </a:fld>
             <a:endParaRPr lang="en-US" dirty="0"/>
           </a:p>
@@ -895,7 +899,7 @@
           <a:p>
             <a:fld id="{85AB7CBB-843F-464A-A764-71D6ADC27CFA}" type="datetime1">
               <a:rPr lang="en-US" smtClean="0"/>
-              <a:t>10/15/2018</a:t>
+              <a:t>10/16/2018</a:t>
             </a:fld>
             <a:endParaRPr lang="en-US" dirty="0"/>
           </a:p>
@@ -1120,7 +1124,7 @@
           <a:p>
             <a:fld id="{CBEFC03D-3A1F-4813-9337-02411FCC3A9A}" type="datetime1">
               <a:rPr lang="en-US" smtClean="0"/>
-              <a:t>10/15/2018</a:t>
+              <a:t>10/16/2018</a:t>
             </a:fld>
             <a:endParaRPr lang="en-US" dirty="0"/>
           </a:p>
@@ -1392,7 +1396,7 @@
           <a:p>
             <a:fld id="{3D638F79-DFA0-4C26-9553-23A017B69AB6}" type="datetime1">
               <a:rPr lang="en-US" smtClean="0"/>
-              <a:t>10/15/2018</a:t>
+              <a:t>10/16/2018</a:t>
             </a:fld>
             <a:endParaRPr lang="en-US" dirty="0"/>
           </a:p>
@@ -1503,7 +1507,7 @@
           <a:p>
             <a:fld id="{AA615CA6-EC4D-4728-8AA6-534BE7E9B67C}" type="datetime1">
               <a:rPr lang="en-US" smtClean="0"/>
-              <a:t>10/15/2018</a:t>
+              <a:t>10/16/2018</a:t>
             </a:fld>
             <a:endParaRPr lang="en-US" dirty="0"/>
           </a:p>
@@ -1688,7 +1692,7 @@
           <a:p>
             <a:fld id="{A70B34E7-E1D9-4FBF-A1A0-4009669A00BF}" type="datetime1">
               <a:rPr lang="en-US" smtClean="0"/>
-              <a:t>10/15/2018</a:t>
+              <a:t>10/16/2018</a:t>
             </a:fld>
             <a:endParaRPr lang="en-US" dirty="0"/>
           </a:p>
@@ -2048,7 +2052,7 @@
           <a:p>
             <a:fld id="{20EBB0C4-6273-4C6E-B9BD-2EDC30F1CD52}" type="datetimeFigureOut">
               <a:rPr lang="en-US" smtClean="0"/>
-              <a:t>10/15/2018</a:t>
+              <a:t>10/16/2018</a:t>
             </a:fld>
             <a:endParaRPr lang="en-US" dirty="0"/>
           </a:p>
@@ -2335,7 +2339,7 @@
           <a:p>
             <a:fld id="{7579E8B6-2F47-420B-83EA-EB2285D13EC9}" type="datetime1">
               <a:rPr lang="en-US" smtClean="0"/>
-              <a:t>10/15/2018</a:t>
+              <a:t>10/16/2018</a:t>
             </a:fld>
             <a:endParaRPr lang="en-US" dirty="0"/>
           </a:p>
@@ -2730,7 +2734,7 @@
           <a:p>
             <a:fld id="{2304803D-B10E-4B90-8456-A0E05393E233}" type="datetime1">
               <a:rPr lang="en-US" smtClean="0"/>
-              <a:t>10/15/2018</a:t>
+              <a:t>10/16/2018</a:t>
             </a:fld>
             <a:endParaRPr lang="en-US" dirty="0"/>
           </a:p>
@@ -2864,7 +2868,7 @@
           <a:p>
             <a:fld id="{CCE1E62F-6CCE-4064-96C2-2084AF883904}" type="datetime1">
               <a:rPr lang="en-US" smtClean="0"/>
-              <a:t>10/15/2018</a:t>
+              <a:t>10/16/2018</a:t>
             </a:fld>
             <a:endParaRPr lang="en-US" dirty="0"/>
           </a:p>
@@ -3051,7 +3055,7 @@
           <a:p>
             <a:fld id="{AA615CA6-EC4D-4728-8AA6-534BE7E9B67C}" type="datetime1">
               <a:rPr lang="en-US" smtClean="0"/>
-              <a:t>10/15/2018</a:t>
+              <a:t>10/16/2018</a:t>
             </a:fld>
             <a:endParaRPr lang="en-US" dirty="0"/>
           </a:p>
@@ -3421,7 +3425,7 @@
           <a:p>
             <a:fld id="{A6139942-0A2E-443A-842F-D6DE74360370}" type="datetime1">
               <a:rPr lang="en-US" smtClean="0"/>
-              <a:t>10/15/2018</a:t>
+              <a:t>10/16/2018</a:t>
             </a:fld>
             <a:endParaRPr lang="en-US" dirty="0"/>
           </a:p>
@@ -3814,7 +3818,7 @@
           <a:p>
             <a:fld id="{C9CAD897-D46E-4AD2-BD9B-49DD3E640873}" type="datetimeFigureOut">
               <a:rPr lang="en-US" smtClean="0"/>
-              <a:t>10/15/2018</a:t>
+              <a:t>10/16/2018</a:t>
             </a:fld>
             <a:endParaRPr lang="en-US" dirty="0"/>
           </a:p>
@@ -4165,7 +4169,7 @@
           <a:p>
             <a:fld id="{3F138946-C5C1-4A11-BA69-F12F43F8A94B}" type="datetime1">
               <a:rPr lang="en-US" smtClean="0"/>
-              <a:t>10/15/2018</a:t>
+              <a:t>10/16/2018</a:t>
             </a:fld>
             <a:endParaRPr lang="en-US" dirty="0"/>
           </a:p>
@@ -7281,6 +7285,675 @@
     <p:extLst>
       <p:ext uri="{BB962C8B-B14F-4D97-AF65-F5344CB8AC3E}">
         <p14:creationId xmlns:p14="http://schemas.microsoft.com/office/powerpoint/2010/main" val="3340891624"/>
+      </p:ext>
+    </p:extLst>
+  </p:cSld>
+  <p:clrMapOvr>
+    <a:masterClrMapping/>
+  </p:clrMapOvr>
+  <mc:AlternateContent xmlns:mc="http://schemas.openxmlformats.org/markup-compatibility/2006" xmlns:p14="http://schemas.microsoft.com/office/powerpoint/2010/main">
+    <mc:Choice Requires="p14">
+      <p:transition spd="med" p14:dur="700">
+        <p:fade/>
+      </p:transition>
+    </mc:Choice>
+    <mc:Fallback xmlns="">
+      <p:transition spd="med">
+        <p:fade/>
+      </p:transition>
+    </mc:Fallback>
+  </mc:AlternateContent>
+</p:sld>
+</file>
+
+<file path=ppt/slides/slide25.xml><?xml version="1.0" encoding="utf-8"?>
+<p:sld xmlns:a="http://schemas.openxmlformats.org/drawingml/2006/main" xmlns:r="http://schemas.openxmlformats.org/officeDocument/2006/relationships" xmlns:p="http://schemas.openxmlformats.org/presentationml/2006/main">
+  <p:cSld>
+    <p:spTree>
+      <p:nvGrpSpPr>
+        <p:cNvPr id="1" name=""/>
+        <p:cNvGrpSpPr/>
+        <p:nvPr/>
+      </p:nvGrpSpPr>
+      <p:grpSpPr>
+        <a:xfrm>
+          <a:off x="0" y="0"/>
+          <a:ext cx="0" cy="0"/>
+          <a:chOff x="0" y="0"/>
+          <a:chExt cx="0" cy="0"/>
+        </a:xfrm>
+      </p:grpSpPr>
+      <p:sp>
+        <p:nvSpPr>
+          <p:cNvPr id="3" name="Title 2">
+            <a:extLst>
+              <a:ext uri="{FF2B5EF4-FFF2-40B4-BE49-F238E27FC236}">
+                <a16:creationId xmlns:a16="http://schemas.microsoft.com/office/drawing/2014/main" id="{F1D6341D-83F6-430C-8BC3-10DA01B46C33}"/>
+              </a:ext>
+            </a:extLst>
+          </p:cNvPr>
+          <p:cNvSpPr>
+            <a:spLocks noGrp="1"/>
+          </p:cNvSpPr>
+          <p:nvPr>
+            <p:ph type="title"/>
+          </p:nvPr>
+        </p:nvSpPr>
+        <p:spPr/>
+        <p:txBody>
+          <a:bodyPr/>
+          <a:lstStyle/>
+          <a:p>
+            <a:r>
+              <a:rPr lang="en-US" dirty="0"/>
+              <a:t>LP 2</a:t>
+            </a:r>
+          </a:p>
+        </p:txBody>
+      </p:sp>
+      <p:sp>
+        <p:nvSpPr>
+          <p:cNvPr id="2" name="Footer Placeholder 1">
+            <a:extLst>
+              <a:ext uri="{FF2B5EF4-FFF2-40B4-BE49-F238E27FC236}">
+                <a16:creationId xmlns:a16="http://schemas.microsoft.com/office/drawing/2014/main" id="{90C6782B-0F85-4E77-98FA-C83E79652A64}"/>
+              </a:ext>
+            </a:extLst>
+          </p:cNvPr>
+          <p:cNvSpPr>
+            <a:spLocks noGrp="1"/>
+          </p:cNvSpPr>
+          <p:nvPr>
+            <p:ph type="ftr" sz="quarter" idx="11"/>
+          </p:nvPr>
+        </p:nvSpPr>
+        <p:spPr/>
+        <p:txBody>
+          <a:bodyPr/>
+          <a:lstStyle/>
+          <a:p>
+            <a:r>
+              <a:rPr lang="en-US"/>
+              <a:t>Add a footer</a:t>
+            </a:r>
+            <a:endParaRPr lang="en-US" dirty="0"/>
+          </a:p>
+        </p:txBody>
+      </p:sp>
+    </p:spTree>
+    <p:extLst>
+      <p:ext uri="{BB962C8B-B14F-4D97-AF65-F5344CB8AC3E}">
+        <p14:creationId xmlns:p14="http://schemas.microsoft.com/office/powerpoint/2010/main" val="3445531229"/>
+      </p:ext>
+    </p:extLst>
+  </p:cSld>
+  <p:clrMapOvr>
+    <a:masterClrMapping/>
+  </p:clrMapOvr>
+  <mc:AlternateContent xmlns:mc="http://schemas.openxmlformats.org/markup-compatibility/2006" xmlns:p14="http://schemas.microsoft.com/office/powerpoint/2010/main">
+    <mc:Choice Requires="p14">
+      <p:transition spd="med" p14:dur="700">
+        <p:fade/>
+      </p:transition>
+    </mc:Choice>
+    <mc:Fallback xmlns="">
+      <p:transition spd="med">
+        <p:fade/>
+      </p:transition>
+    </mc:Fallback>
+  </mc:AlternateContent>
+</p:sld>
+</file>
+
+<file path=ppt/slides/slide26.xml><?xml version="1.0" encoding="utf-8"?>
+<p:sld xmlns:a="http://schemas.openxmlformats.org/drawingml/2006/main" xmlns:r="http://schemas.openxmlformats.org/officeDocument/2006/relationships" xmlns:p="http://schemas.openxmlformats.org/presentationml/2006/main">
+  <p:cSld>
+    <p:spTree>
+      <p:nvGrpSpPr>
+        <p:cNvPr id="1" name=""/>
+        <p:cNvGrpSpPr/>
+        <p:nvPr/>
+      </p:nvGrpSpPr>
+      <p:grpSpPr>
+        <a:xfrm>
+          <a:off x="0" y="0"/>
+          <a:ext cx="0" cy="0"/>
+          <a:chOff x="0" y="0"/>
+          <a:chExt cx="0" cy="0"/>
+        </a:xfrm>
+      </p:grpSpPr>
+      <p:sp>
+        <p:nvSpPr>
+          <p:cNvPr id="4" name="Title 3">
+            <a:extLst>
+              <a:ext uri="{FF2B5EF4-FFF2-40B4-BE49-F238E27FC236}">
+                <a16:creationId xmlns:a16="http://schemas.microsoft.com/office/drawing/2014/main" id="{3B4E6609-1584-431B-9643-D8D89037BA13}"/>
+              </a:ext>
+            </a:extLst>
+          </p:cNvPr>
+          <p:cNvSpPr>
+            <a:spLocks noGrp="1"/>
+          </p:cNvSpPr>
+          <p:nvPr>
+            <p:ph type="title"/>
+          </p:nvPr>
+        </p:nvSpPr>
+        <p:spPr/>
+        <p:txBody>
+          <a:bodyPr/>
+          <a:lstStyle/>
+          <a:p>
+            <a:r>
+              <a:rPr lang="en-US" dirty="0"/>
+              <a:t>Ohms Law</a:t>
+            </a:r>
+          </a:p>
+        </p:txBody>
+      </p:sp>
+      <p:sp>
+        <p:nvSpPr>
+          <p:cNvPr id="5" name="Content Placeholder 4">
+            <a:extLst>
+              <a:ext uri="{FF2B5EF4-FFF2-40B4-BE49-F238E27FC236}">
+                <a16:creationId xmlns:a16="http://schemas.microsoft.com/office/drawing/2014/main" id="{5D9611DD-3863-4114-8320-6C2101D9E0E1}"/>
+              </a:ext>
+            </a:extLst>
+          </p:cNvPr>
+          <p:cNvSpPr>
+            <a:spLocks noGrp="1"/>
+          </p:cNvSpPr>
+          <p:nvPr>
+            <p:ph idx="1"/>
+          </p:nvPr>
+        </p:nvSpPr>
+        <p:spPr/>
+        <p:txBody>
+          <a:bodyPr>
+            <a:normAutofit lnSpcReduction="10000"/>
+          </a:bodyPr>
+          <a:lstStyle/>
+          <a:p>
+            <a:r>
+              <a:rPr lang="en-US" dirty="0"/>
+              <a:t>Letter symbols</a:t>
+            </a:r>
+          </a:p>
+          <a:p>
+            <a:pPr marL="544068" lvl="1" indent="-342900">
+              <a:buFont typeface="+mj-lt"/>
+              <a:buAutoNum type="arabicPeriod"/>
+            </a:pPr>
+            <a:r>
+              <a:rPr lang="en-US" dirty="0"/>
+              <a:t>Voltage (E or V)</a:t>
+            </a:r>
+          </a:p>
+          <a:p>
+            <a:pPr marL="544068" lvl="1" indent="-342900">
+              <a:buFont typeface="+mj-lt"/>
+              <a:buAutoNum type="arabicPeriod"/>
+            </a:pPr>
+            <a:r>
+              <a:rPr lang="en-US" dirty="0"/>
+              <a:t>Current (I)</a:t>
+            </a:r>
+          </a:p>
+          <a:p>
+            <a:pPr marL="544068" lvl="1" indent="-342900">
+              <a:buFont typeface="+mj-lt"/>
+              <a:buAutoNum type="arabicPeriod"/>
+            </a:pPr>
+            <a:r>
+              <a:rPr lang="en-US" dirty="0"/>
+              <a:t>Resistance (R)</a:t>
+            </a:r>
+          </a:p>
+          <a:p>
+            <a:pPr marL="0">
+              <a:buNone/>
+            </a:pPr>
+            <a:r>
+              <a:rPr lang="en-US" dirty="0"/>
+              <a:t>To solve for E (voltage), use the formula:</a:t>
+            </a:r>
+          </a:p>
+          <a:p>
+            <a:pPr marL="0">
+              <a:buNone/>
+            </a:pPr>
+            <a:r>
+              <a:rPr lang="en-US" dirty="0"/>
+              <a:t>	E = I x R</a:t>
+            </a:r>
+          </a:p>
+          <a:p>
+            <a:pPr marL="0">
+              <a:buNone/>
+            </a:pPr>
+            <a:r>
+              <a:rPr lang="en-US" dirty="0"/>
+              <a:t>To solve for I (current), this same formula can be written as:</a:t>
+            </a:r>
+          </a:p>
+          <a:p>
+            <a:pPr marL="0">
+              <a:buNone/>
+            </a:pPr>
+            <a:r>
+              <a:rPr lang="en-US" dirty="0"/>
+              <a:t>	I =  E / R</a:t>
+            </a:r>
+          </a:p>
+          <a:p>
+            <a:pPr marL="0">
+              <a:buNone/>
+            </a:pPr>
+            <a:r>
+              <a:rPr lang="en-US" dirty="0"/>
+              <a:t>To solve for R (resistance), arrange it as</a:t>
+            </a:r>
+          </a:p>
+          <a:p>
+            <a:pPr marL="0">
+              <a:buNone/>
+            </a:pPr>
+            <a:r>
+              <a:rPr lang="en-US" dirty="0"/>
+              <a:t>	R = E / I</a:t>
+            </a:r>
+          </a:p>
+          <a:p>
+            <a:endParaRPr lang="en-US" dirty="0"/>
+          </a:p>
+        </p:txBody>
+      </p:sp>
+      <p:sp>
+        <p:nvSpPr>
+          <p:cNvPr id="3" name="Footer Placeholder 2">
+            <a:extLst>
+              <a:ext uri="{FF2B5EF4-FFF2-40B4-BE49-F238E27FC236}">
+                <a16:creationId xmlns:a16="http://schemas.microsoft.com/office/drawing/2014/main" id="{9D953939-3B99-488A-B8D2-60A9D4BB9F09}"/>
+              </a:ext>
+            </a:extLst>
+          </p:cNvPr>
+          <p:cNvSpPr>
+            <a:spLocks noGrp="1"/>
+          </p:cNvSpPr>
+          <p:nvPr>
+            <p:ph type="ftr" sz="quarter" idx="11"/>
+          </p:nvPr>
+        </p:nvSpPr>
+        <p:spPr/>
+        <p:txBody>
+          <a:bodyPr/>
+          <a:lstStyle/>
+          <a:p>
+            <a:r>
+              <a:rPr lang="en-US"/>
+              <a:t>Add a footer</a:t>
+            </a:r>
+            <a:endParaRPr lang="en-US" dirty="0"/>
+          </a:p>
+        </p:txBody>
+      </p:sp>
+    </p:spTree>
+    <p:extLst>
+      <p:ext uri="{BB962C8B-B14F-4D97-AF65-F5344CB8AC3E}">
+        <p14:creationId xmlns:p14="http://schemas.microsoft.com/office/powerpoint/2010/main" val="440522808"/>
+      </p:ext>
+    </p:extLst>
+  </p:cSld>
+  <p:clrMapOvr>
+    <a:masterClrMapping/>
+  </p:clrMapOvr>
+  <mc:AlternateContent xmlns:mc="http://schemas.openxmlformats.org/markup-compatibility/2006" xmlns:p14="http://schemas.microsoft.com/office/powerpoint/2010/main">
+    <mc:Choice Requires="p14">
+      <p:transition spd="med" p14:dur="700">
+        <p:fade/>
+      </p:transition>
+    </mc:Choice>
+    <mc:Fallback xmlns="">
+      <p:transition spd="med">
+        <p:fade/>
+      </p:transition>
+    </mc:Fallback>
+  </mc:AlternateContent>
+</p:sld>
+</file>
+
+<file path=ppt/slides/slide27.xml><?xml version="1.0" encoding="utf-8"?>
+<p:sld xmlns:a="http://schemas.openxmlformats.org/drawingml/2006/main" xmlns:r="http://schemas.openxmlformats.org/officeDocument/2006/relationships" xmlns:p="http://schemas.openxmlformats.org/presentationml/2006/main">
+  <p:cSld>
+    <p:bg>
+      <p:bgPr>
+        <a:solidFill>
+          <a:schemeClr val="bg1"/>
+        </a:solidFill>
+        <a:effectLst/>
+      </p:bgPr>
+    </p:bg>
+    <p:spTree>
+      <p:nvGrpSpPr>
+        <p:cNvPr id="1" name=""/>
+        <p:cNvGrpSpPr/>
+        <p:nvPr/>
+      </p:nvGrpSpPr>
+      <p:grpSpPr>
+        <a:xfrm>
+          <a:off x="0" y="0"/>
+          <a:ext cx="0" cy="0"/>
+          <a:chOff x="0" y="0"/>
+          <a:chExt cx="0" cy="0"/>
+        </a:xfrm>
+      </p:grpSpPr>
+      <p:sp>
+        <p:nvSpPr>
+          <p:cNvPr id="1028" name="Rectangle 70">
+            <a:extLst>
+              <a:ext uri="{FF2B5EF4-FFF2-40B4-BE49-F238E27FC236}">
+                <a16:creationId xmlns:a16="http://schemas.microsoft.com/office/drawing/2014/main" id="{C2579DAE-C141-48DB-810E-C070C300819E}"/>
+              </a:ext>
+              <a:ext uri="{C183D7F6-B498-43B3-948B-1728B52AA6E4}">
+                <adec:decorative xmlns:adec="http://schemas.microsoft.com/office/drawing/2017/decorative" val="1"/>
+              </a:ext>
+            </a:extLst>
+          </p:cNvPr>
+          <p:cNvSpPr>
+            <a:spLocks noGrp="1" noRot="1" noChangeAspect="1" noMove="1" noResize="1" noEditPoints="1" noAdjustHandles="1" noChangeArrowheads="1" noChangeShapeType="1" noTextEdit="1"/>
+          </p:cNvSpPr>
+          <p:nvPr>
+            <p:extLst>
+              <p:ext uri="{386F3935-93C4-4BCD-93E2-E3B085C9AB24}">
+                <p16:designElem xmlns:p16="http://schemas.microsoft.com/office/powerpoint/2015/main" val="1"/>
+              </p:ext>
+            </p:extLst>
+          </p:nvPr>
+        </p:nvSpPr>
+        <p:spPr>
+          <a:xfrm>
+            <a:off x="3175" y="6400800"/>
+            <a:ext cx="12188825" cy="457200"/>
+          </a:xfrm>
+          <a:prstGeom prst="rect">
+            <a:avLst/>
+          </a:prstGeom>
+          <a:solidFill>
+            <a:schemeClr val="accent2"/>
+          </a:solidFill>
+          <a:ln>
+            <a:noFill/>
+          </a:ln>
+        </p:spPr>
+        <p:style>
+          <a:lnRef idx="2">
+            <a:schemeClr val="accent1">
+              <a:shade val="50000"/>
+            </a:schemeClr>
+          </a:lnRef>
+          <a:fillRef idx="1">
+            <a:schemeClr val="accent1"/>
+          </a:fillRef>
+          <a:effectRef idx="0">
+            <a:schemeClr val="accent1"/>
+          </a:effectRef>
+          <a:fontRef idx="minor">
+            <a:schemeClr val="lt1"/>
+          </a:fontRef>
+        </p:style>
+      </p:sp>
+      <p:sp>
+        <p:nvSpPr>
+          <p:cNvPr id="1029" name="Rectangle 72">
+            <a:extLst>
+              <a:ext uri="{FF2B5EF4-FFF2-40B4-BE49-F238E27FC236}">
+                <a16:creationId xmlns:a16="http://schemas.microsoft.com/office/drawing/2014/main" id="{02FD90C3-6350-4D5B-9738-6E94EDF30F74}"/>
+              </a:ext>
+              <a:ext uri="{C183D7F6-B498-43B3-948B-1728B52AA6E4}">
+                <adec:decorative xmlns:adec="http://schemas.microsoft.com/office/drawing/2017/decorative" val="1"/>
+              </a:ext>
+            </a:extLst>
+          </p:cNvPr>
+          <p:cNvSpPr>
+            <a:spLocks noGrp="1" noRot="1" noChangeAspect="1" noMove="1" noResize="1" noEditPoints="1" noAdjustHandles="1" noChangeArrowheads="1" noChangeShapeType="1" noTextEdit="1"/>
+          </p:cNvSpPr>
+          <p:nvPr>
+            <p:extLst>
+              <p:ext uri="{386F3935-93C4-4BCD-93E2-E3B085C9AB24}">
+                <p16:designElem xmlns:p16="http://schemas.microsoft.com/office/powerpoint/2015/main" val="1"/>
+              </p:ext>
+            </p:extLst>
+          </p:nvPr>
+        </p:nvSpPr>
+        <p:spPr>
+          <a:xfrm>
+            <a:off x="15" y="6334316"/>
+            <a:ext cx="12188825" cy="64008"/>
+          </a:xfrm>
+          <a:prstGeom prst="rect">
+            <a:avLst/>
+          </a:prstGeom>
+          <a:solidFill>
+            <a:schemeClr val="accent1"/>
+          </a:solidFill>
+          <a:ln>
+            <a:noFill/>
+          </a:ln>
+        </p:spPr>
+        <p:style>
+          <a:lnRef idx="2">
+            <a:schemeClr val="accent1">
+              <a:shade val="50000"/>
+            </a:schemeClr>
+          </a:lnRef>
+          <a:fillRef idx="1">
+            <a:schemeClr val="accent1"/>
+          </a:fillRef>
+          <a:effectRef idx="0">
+            <a:schemeClr val="accent1"/>
+          </a:effectRef>
+          <a:fontRef idx="minor">
+            <a:schemeClr val="lt1"/>
+          </a:fontRef>
+        </p:style>
+      </p:sp>
+      <p:pic>
+        <p:nvPicPr>
+          <p:cNvPr id="1026" name="Picture 2" descr="Image result for ohm's law">
+            <a:extLst>
+              <a:ext uri="{FF2B5EF4-FFF2-40B4-BE49-F238E27FC236}">
+                <a16:creationId xmlns:a16="http://schemas.microsoft.com/office/drawing/2014/main" id="{CE757C35-88F3-44B9-9343-18A8BD1ADF19}"/>
+              </a:ext>
+            </a:extLst>
+          </p:cNvPr>
+          <p:cNvPicPr>
+            <a:picLocks noChangeAspect="1" noChangeArrowheads="1"/>
+          </p:cNvPicPr>
+          <p:nvPr/>
+        </p:nvPicPr>
+        <p:blipFill>
+          <a:blip r:embed="rId2">
+            <a:extLst>
+              <a:ext uri="{28A0092B-C50C-407E-A947-70E740481C1C}">
+                <a14:useLocalDpi xmlns:a14="http://schemas.microsoft.com/office/drawing/2010/main" val="0"/>
+              </a:ext>
+            </a:extLst>
+          </a:blip>
+          <a:srcRect/>
+          <a:stretch>
+            <a:fillRect/>
+          </a:stretch>
+        </p:blipFill>
+        <p:spPr bwMode="auto">
+          <a:xfrm>
+            <a:off x="1067733" y="643467"/>
+            <a:ext cx="10056534" cy="5050225"/>
+          </a:xfrm>
+          <a:prstGeom prst="rect">
+            <a:avLst/>
+          </a:prstGeom>
+          <a:noFill/>
+          <a:extLst>
+            <a:ext uri="{909E8E84-426E-40DD-AFC4-6F175D3DCCD1}">
+              <a14:hiddenFill xmlns:a14="http://schemas.microsoft.com/office/drawing/2010/main">
+                <a:solidFill>
+                  <a:srgbClr val="FFFFFF"/>
+                </a:solidFill>
+              </a14:hiddenFill>
+            </a:ext>
+          </a:extLst>
+        </p:spPr>
+      </p:pic>
+      <p:sp>
+        <p:nvSpPr>
+          <p:cNvPr id="4" name="Footer Placeholder 3">
+            <a:extLst>
+              <a:ext uri="{FF2B5EF4-FFF2-40B4-BE49-F238E27FC236}">
+                <a16:creationId xmlns:a16="http://schemas.microsoft.com/office/drawing/2014/main" id="{EBDE5E73-5F38-49D1-8493-1428E6F1FD0C}"/>
+              </a:ext>
+            </a:extLst>
+          </p:cNvPr>
+          <p:cNvSpPr>
+            <a:spLocks noGrp="1"/>
+          </p:cNvSpPr>
+          <p:nvPr>
+            <p:ph type="ftr" sz="quarter" idx="11"/>
+          </p:nvPr>
+        </p:nvSpPr>
+        <p:spPr>
+          <a:xfrm>
+            <a:off x="3686185" y="6459785"/>
+            <a:ext cx="4822804" cy="365125"/>
+          </a:xfrm>
+        </p:spPr>
+        <p:txBody>
+          <a:bodyPr vert="horz" lIns="91440" tIns="45720" rIns="91440" bIns="45720" rtlCol="0" anchor="ctr">
+            <a:normAutofit lnSpcReduction="10000"/>
+          </a:bodyPr>
+          <a:lstStyle/>
+          <a:p>
+            <a:pPr>
+              <a:spcAft>
+                <a:spcPts val="600"/>
+              </a:spcAft>
+            </a:pPr>
+            <a:r>
+              <a:rPr lang="en-US" dirty="0"/>
+              <a:t>SAMPLE QUESTION - https://www.grc.nasa.gov/www/k-12/Sample_Projects/Ohms_Law/ohmslaw.html</a:t>
+            </a:r>
+            <a:endParaRPr lang="en-US" kern="1200" cap="all" baseline="0" dirty="0">
+              <a:solidFill>
+                <a:srgbClr val="FFFFFF"/>
+              </a:solidFill>
+              <a:latin typeface="+mn-lt"/>
+              <a:ea typeface="+mn-ea"/>
+              <a:cs typeface="+mn-cs"/>
+            </a:endParaRPr>
+          </a:p>
+        </p:txBody>
+      </p:sp>
+    </p:spTree>
+    <p:extLst>
+      <p:ext uri="{BB962C8B-B14F-4D97-AF65-F5344CB8AC3E}">
+        <p14:creationId xmlns:p14="http://schemas.microsoft.com/office/powerpoint/2010/main" val="3790694998"/>
+      </p:ext>
+    </p:extLst>
+  </p:cSld>
+  <p:clrMapOvr>
+    <a:masterClrMapping/>
+  </p:clrMapOvr>
+  <mc:AlternateContent xmlns:mc="http://schemas.openxmlformats.org/markup-compatibility/2006" xmlns:p14="http://schemas.microsoft.com/office/powerpoint/2010/main">
+    <mc:Choice Requires="p14">
+      <p:transition spd="med" p14:dur="700">
+        <p:fade/>
+      </p:transition>
+    </mc:Choice>
+    <mc:Fallback xmlns="">
+      <p:transition spd="med">
+        <p:fade/>
+      </p:transition>
+    </mc:Fallback>
+  </mc:AlternateContent>
+</p:sld>
+</file>
+
+<file path=ppt/slides/slide28.xml><?xml version="1.0" encoding="utf-8"?>
+<p:sld xmlns:a="http://schemas.openxmlformats.org/drawingml/2006/main" xmlns:r="http://schemas.openxmlformats.org/officeDocument/2006/relationships" xmlns:p="http://schemas.openxmlformats.org/presentationml/2006/main">
+  <p:cSld>
+    <p:spTree>
+      <p:nvGrpSpPr>
+        <p:cNvPr id="1" name=""/>
+        <p:cNvGrpSpPr/>
+        <p:nvPr/>
+      </p:nvGrpSpPr>
+      <p:grpSpPr>
+        <a:xfrm>
+          <a:off x="0" y="0"/>
+          <a:ext cx="0" cy="0"/>
+          <a:chOff x="0" y="0"/>
+          <a:chExt cx="0" cy="0"/>
+        </a:xfrm>
+      </p:grpSpPr>
+      <p:sp>
+        <p:nvSpPr>
+          <p:cNvPr id="3" name="Title 2">
+            <a:extLst>
+              <a:ext uri="{FF2B5EF4-FFF2-40B4-BE49-F238E27FC236}">
+                <a16:creationId xmlns:a16="http://schemas.microsoft.com/office/drawing/2014/main" id="{B521E028-B330-43CA-8A71-66D5345B1436}"/>
+              </a:ext>
+            </a:extLst>
+          </p:cNvPr>
+          <p:cNvSpPr>
+            <a:spLocks noGrp="1"/>
+          </p:cNvSpPr>
+          <p:nvPr>
+            <p:ph type="title"/>
+          </p:nvPr>
+        </p:nvSpPr>
+        <p:spPr/>
+        <p:txBody>
+          <a:bodyPr/>
+          <a:lstStyle/>
+          <a:p>
+            <a:r>
+              <a:rPr lang="en-US" dirty="0"/>
+              <a:t>Ohm’s Law Practice Worksheet</a:t>
+            </a:r>
+          </a:p>
+        </p:txBody>
+      </p:sp>
+      <p:sp>
+        <p:nvSpPr>
+          <p:cNvPr id="2" name="Footer Placeholder 1">
+            <a:extLst>
+              <a:ext uri="{FF2B5EF4-FFF2-40B4-BE49-F238E27FC236}">
+                <a16:creationId xmlns:a16="http://schemas.microsoft.com/office/drawing/2014/main" id="{3D99DD31-E647-4CF6-89BF-9126B5CA87E4}"/>
+              </a:ext>
+            </a:extLst>
+          </p:cNvPr>
+          <p:cNvSpPr>
+            <a:spLocks noGrp="1"/>
+          </p:cNvSpPr>
+          <p:nvPr>
+            <p:ph type="ftr" sz="quarter" idx="11"/>
+          </p:nvPr>
+        </p:nvSpPr>
+        <p:spPr/>
+        <p:txBody>
+          <a:bodyPr/>
+          <a:lstStyle/>
+          <a:p>
+            <a:r>
+              <a:rPr lang="en-US"/>
+              <a:t>Add a footer</a:t>
+            </a:r>
+            <a:endParaRPr lang="en-US" dirty="0"/>
+          </a:p>
+        </p:txBody>
+      </p:sp>
+    </p:spTree>
+    <p:extLst>
+      <p:ext uri="{BB962C8B-B14F-4D97-AF65-F5344CB8AC3E}">
+        <p14:creationId xmlns:p14="http://schemas.microsoft.com/office/powerpoint/2010/main" val="578439308"/>
       </p:ext>
     </p:extLst>
   </p:cSld>

</xml_diff>